<commit_message>
ACM SAC - primeira versão finalizada do artigo (falta referências)
Mestrado
- anotações no artigo de Smolic
- novas imagens no arquivo de imagens
</commit_message>
<xml_diff>
--- a/Imagens/imagens-para-artigos-dissertacao.pptx
+++ b/Imagens/imagens-para-artigos-dissertacao.pptx
@@ -17,6 +17,8 @@
     <p:sldId id="264" r:id="rId11"/>
     <p:sldId id="265" r:id="rId12"/>
     <p:sldId id="267" r:id="rId13"/>
+    <p:sldId id="269" r:id="rId14"/>
+    <p:sldId id="270" r:id="rId15"/>
   </p:sldIdLst>
   <p:sldSz cx="9144000" cy="6858000" type="screen4x3"/>
   <p:notesSz cx="6858000" cy="9144000"/>
@@ -299,7 +301,7 @@
           <a:p>
             <a:fld id="{E14A8D8A-9BF6-4F09-B8D2-3E331CA72F09}" type="datetimeFigureOut">
               <a:rPr lang="pt-BR" smtClean="0"/>
-              <a:t>24/8/2011</a:t>
+              <a:t>28/8/2011</a:t>
             </a:fld>
             <a:endParaRPr lang="pt-BR"/>
           </a:p>
@@ -469,7 +471,7 @@
           <a:p>
             <a:fld id="{E14A8D8A-9BF6-4F09-B8D2-3E331CA72F09}" type="datetimeFigureOut">
               <a:rPr lang="pt-BR" smtClean="0"/>
-              <a:t>24/8/2011</a:t>
+              <a:t>28/8/2011</a:t>
             </a:fld>
             <a:endParaRPr lang="pt-BR"/>
           </a:p>
@@ -649,7 +651,7 @@
           <a:p>
             <a:fld id="{E14A8D8A-9BF6-4F09-B8D2-3E331CA72F09}" type="datetimeFigureOut">
               <a:rPr lang="pt-BR" smtClean="0"/>
-              <a:t>24/8/2011</a:t>
+              <a:t>28/8/2011</a:t>
             </a:fld>
             <a:endParaRPr lang="pt-BR"/>
           </a:p>
@@ -819,7 +821,7 @@
           <a:p>
             <a:fld id="{E14A8D8A-9BF6-4F09-B8D2-3E331CA72F09}" type="datetimeFigureOut">
               <a:rPr lang="pt-BR" smtClean="0"/>
-              <a:t>24/8/2011</a:t>
+              <a:t>28/8/2011</a:t>
             </a:fld>
             <a:endParaRPr lang="pt-BR"/>
           </a:p>
@@ -1065,7 +1067,7 @@
           <a:p>
             <a:fld id="{E14A8D8A-9BF6-4F09-B8D2-3E331CA72F09}" type="datetimeFigureOut">
               <a:rPr lang="pt-BR" smtClean="0"/>
-              <a:t>24/8/2011</a:t>
+              <a:t>28/8/2011</a:t>
             </a:fld>
             <a:endParaRPr lang="pt-BR"/>
           </a:p>
@@ -1353,7 +1355,7 @@
           <a:p>
             <a:fld id="{E14A8D8A-9BF6-4F09-B8D2-3E331CA72F09}" type="datetimeFigureOut">
               <a:rPr lang="pt-BR" smtClean="0"/>
-              <a:t>24/8/2011</a:t>
+              <a:t>28/8/2011</a:t>
             </a:fld>
             <a:endParaRPr lang="pt-BR"/>
           </a:p>
@@ -1775,7 +1777,7 @@
           <a:p>
             <a:fld id="{E14A8D8A-9BF6-4F09-B8D2-3E331CA72F09}" type="datetimeFigureOut">
               <a:rPr lang="pt-BR" smtClean="0"/>
-              <a:t>24/8/2011</a:t>
+              <a:t>28/8/2011</a:t>
             </a:fld>
             <a:endParaRPr lang="pt-BR"/>
           </a:p>
@@ -1893,7 +1895,7 @@
           <a:p>
             <a:fld id="{E14A8D8A-9BF6-4F09-B8D2-3E331CA72F09}" type="datetimeFigureOut">
               <a:rPr lang="pt-BR" smtClean="0"/>
-              <a:t>24/8/2011</a:t>
+              <a:t>28/8/2011</a:t>
             </a:fld>
             <a:endParaRPr lang="pt-BR"/>
           </a:p>
@@ -1988,7 +1990,7 @@
           <a:p>
             <a:fld id="{E14A8D8A-9BF6-4F09-B8D2-3E331CA72F09}" type="datetimeFigureOut">
               <a:rPr lang="pt-BR" smtClean="0"/>
-              <a:t>24/8/2011</a:t>
+              <a:t>28/8/2011</a:t>
             </a:fld>
             <a:endParaRPr lang="pt-BR"/>
           </a:p>
@@ -2265,7 +2267,7 @@
           <a:p>
             <a:fld id="{E14A8D8A-9BF6-4F09-B8D2-3E331CA72F09}" type="datetimeFigureOut">
               <a:rPr lang="pt-BR" smtClean="0"/>
-              <a:t>24/8/2011</a:t>
+              <a:t>28/8/2011</a:t>
             </a:fld>
             <a:endParaRPr lang="pt-BR"/>
           </a:p>
@@ -2518,7 +2520,7 @@
           <a:p>
             <a:fld id="{E14A8D8A-9BF6-4F09-B8D2-3E331CA72F09}" type="datetimeFigureOut">
               <a:rPr lang="pt-BR" smtClean="0"/>
-              <a:t>24/8/2011</a:t>
+              <a:t>28/8/2011</a:t>
             </a:fld>
             <a:endParaRPr lang="pt-BR"/>
           </a:p>
@@ -2731,7 +2733,7 @@
           <a:p>
             <a:fld id="{E14A8D8A-9BF6-4F09-B8D2-3E331CA72F09}" type="datetimeFigureOut">
               <a:rPr lang="pt-BR" smtClean="0"/>
-              <a:t>24/8/2011</a:t>
+              <a:t>28/8/2011</a:t>
             </a:fld>
             <a:endParaRPr lang="pt-BR"/>
           </a:p>
@@ -4910,6 +4912,1957 @@
 </p:sld>
 </file>
 
+<file path=ppt/slides/slide13.xml><?xml version="1.0" encoding="utf-8"?>
+<p:sld xmlns:a="http://schemas.openxmlformats.org/drawingml/2006/main" xmlns:r="http://schemas.openxmlformats.org/officeDocument/2006/relationships" xmlns:p="http://schemas.openxmlformats.org/presentationml/2006/main">
+  <p:cSld>
+    <p:spTree>
+      <p:nvGrpSpPr>
+        <p:cNvPr id="1" name=""/>
+        <p:cNvGrpSpPr/>
+        <p:nvPr/>
+      </p:nvGrpSpPr>
+      <p:grpSpPr>
+        <a:xfrm>
+          <a:off x="0" y="0"/>
+          <a:ext cx="0" cy="0"/>
+          <a:chOff x="0" y="0"/>
+          <a:chExt cx="0" cy="0"/>
+        </a:xfrm>
+      </p:grpSpPr>
+      <p:sp>
+        <p:nvSpPr>
+          <p:cNvPr id="2" name="Título 1"/>
+          <p:cNvSpPr>
+            <a:spLocks noGrp="1"/>
+          </p:cNvSpPr>
+          <p:nvPr>
+            <p:ph type="title"/>
+          </p:nvPr>
+        </p:nvSpPr>
+        <p:spPr/>
+        <p:txBody>
+          <a:bodyPr/>
+          <a:lstStyle/>
+          <a:p>
+            <a:r>
+              <a:rPr lang="en-US" smtClean="0"/>
+              <a:t>Anaglyph Conversion Process</a:t>
+            </a:r>
+            <a:endParaRPr lang="en-US"/>
+          </a:p>
+        </p:txBody>
+      </p:sp>
+      <p:grpSp>
+        <p:nvGrpSpPr>
+          <p:cNvPr id="4" name="Grupo 3"/>
+          <p:cNvGrpSpPr/>
+          <p:nvPr/>
+        </p:nvGrpSpPr>
+        <p:grpSpPr>
+          <a:xfrm>
+            <a:off x="755576" y="1268760"/>
+            <a:ext cx="6408712" cy="5832648"/>
+            <a:chOff x="1547664" y="44624"/>
+            <a:chExt cx="6408712" cy="5832648"/>
+          </a:xfrm>
+        </p:grpSpPr>
+        <p:cxnSp>
+          <p:nvCxnSpPr>
+            <p:cNvPr id="5" name="Conector angulado 4"/>
+            <p:cNvCxnSpPr>
+              <a:endCxn id="26" idx="1"/>
+            </p:cNvCxnSpPr>
+            <p:nvPr/>
+          </p:nvCxnSpPr>
+          <p:spPr>
+            <a:xfrm rot="16200000" flipH="1">
+              <a:off x="1680280" y="3040215"/>
+              <a:ext cx="2916324" cy="301237"/>
+            </a:xfrm>
+            <a:prstGeom prst="bentConnector2">
+              <a:avLst/>
+            </a:prstGeom>
+            <a:ln w="28575">
+              <a:tailEnd type="arrow"/>
+            </a:ln>
+          </p:spPr>
+          <p:style>
+            <a:lnRef idx="1">
+              <a:schemeClr val="dk1"/>
+            </a:lnRef>
+            <a:fillRef idx="0">
+              <a:schemeClr val="dk1"/>
+            </a:fillRef>
+            <a:effectRef idx="0">
+              <a:schemeClr val="dk1"/>
+            </a:effectRef>
+            <a:fontRef idx="minor">
+              <a:schemeClr val="tx1"/>
+            </a:fontRef>
+          </p:style>
+        </p:cxnSp>
+        <p:cxnSp>
+          <p:nvCxnSpPr>
+            <p:cNvPr id="6" name="Conector angulado 5"/>
+            <p:cNvCxnSpPr>
+              <a:endCxn id="26" idx="3"/>
+            </p:cNvCxnSpPr>
+            <p:nvPr/>
+          </p:nvCxnSpPr>
+          <p:spPr>
+            <a:xfrm rot="5400000">
+              <a:off x="4524597" y="3089425"/>
+              <a:ext cx="2916324" cy="202819"/>
+            </a:xfrm>
+            <a:prstGeom prst="bentConnector2">
+              <a:avLst/>
+            </a:prstGeom>
+            <a:ln w="28575">
+              <a:tailEnd type="arrow"/>
+            </a:ln>
+          </p:spPr>
+          <p:style>
+            <a:lnRef idx="1">
+              <a:schemeClr val="dk1"/>
+            </a:lnRef>
+            <a:fillRef idx="0">
+              <a:schemeClr val="dk1"/>
+            </a:fillRef>
+            <a:effectRef idx="0">
+              <a:schemeClr val="dk1"/>
+            </a:effectRef>
+            <a:fontRef idx="minor">
+              <a:schemeClr val="tx1"/>
+            </a:fontRef>
+          </p:style>
+        </p:cxnSp>
+        <p:sp>
+          <p:nvSpPr>
+            <p:cNvPr id="7" name="Retângulo de cantos arredondados 6"/>
+            <p:cNvSpPr/>
+            <p:nvPr/>
+          </p:nvSpPr>
+          <p:spPr>
+            <a:xfrm>
+              <a:off x="2051720" y="1988840"/>
+              <a:ext cx="1872208" cy="720080"/>
+            </a:xfrm>
+            <a:prstGeom prst="roundRect">
+              <a:avLst/>
+            </a:prstGeom>
+          </p:spPr>
+          <p:style>
+            <a:lnRef idx="2">
+              <a:schemeClr val="dk1"/>
+            </a:lnRef>
+            <a:fillRef idx="1">
+              <a:schemeClr val="lt1"/>
+            </a:fillRef>
+            <a:effectRef idx="0">
+              <a:schemeClr val="dk1"/>
+            </a:effectRef>
+            <a:fontRef idx="minor">
+              <a:schemeClr val="dk1"/>
+            </a:fontRef>
+          </p:style>
+          <p:txBody>
+            <a:bodyPr rtlCol="0" anchor="ctr"/>
+            <a:lstStyle/>
+            <a:p>
+              <a:pPr algn="ctr"/>
+              <a:r>
+                <a:rPr lang="en-US" dirty="0" smtClean="0"/>
+                <a:t>Green-magenta anaglyph</a:t>
+              </a:r>
+              <a:endParaRPr lang="en-US" dirty="0"/>
+            </a:p>
+          </p:txBody>
+        </p:sp>
+        <p:sp>
+          <p:nvSpPr>
+            <p:cNvPr id="8" name="Retângulo de cantos arredondados 7"/>
+            <p:cNvSpPr/>
+            <p:nvPr/>
+          </p:nvSpPr>
+          <p:spPr>
+            <a:xfrm>
+              <a:off x="5148064" y="1988840"/>
+              <a:ext cx="1872208" cy="720080"/>
+            </a:xfrm>
+            <a:prstGeom prst="roundRect">
+              <a:avLst/>
+            </a:prstGeom>
+          </p:spPr>
+          <p:style>
+            <a:lnRef idx="2">
+              <a:schemeClr val="dk1"/>
+            </a:lnRef>
+            <a:fillRef idx="1">
+              <a:schemeClr val="lt1"/>
+            </a:fillRef>
+            <a:effectRef idx="0">
+              <a:schemeClr val="dk1"/>
+            </a:effectRef>
+            <a:fontRef idx="minor">
+              <a:schemeClr val="dk1"/>
+            </a:fontRef>
+          </p:style>
+          <p:txBody>
+            <a:bodyPr rtlCol="0" anchor="ctr"/>
+            <a:lstStyle/>
+            <a:p>
+              <a:pPr algn="ctr"/>
+              <a:r>
+                <a:rPr lang="en-US" dirty="0" smtClean="0"/>
+                <a:t>Complementary Anaglyph</a:t>
+              </a:r>
+              <a:endParaRPr lang="en-US" dirty="0"/>
+            </a:p>
+          </p:txBody>
+        </p:sp>
+        <p:sp>
+          <p:nvSpPr>
+            <p:cNvPr id="9" name="Retângulo de cantos arredondados 8"/>
+            <p:cNvSpPr/>
+            <p:nvPr/>
+          </p:nvSpPr>
+          <p:spPr>
+            <a:xfrm>
+              <a:off x="2051720" y="44624"/>
+              <a:ext cx="1872208" cy="720080"/>
+            </a:xfrm>
+            <a:prstGeom prst="roundRect">
+              <a:avLst/>
+            </a:prstGeom>
+          </p:spPr>
+          <p:style>
+            <a:lnRef idx="2">
+              <a:schemeClr val="dk1"/>
+            </a:lnRef>
+            <a:fillRef idx="1">
+              <a:schemeClr val="lt1"/>
+            </a:fillRef>
+            <a:effectRef idx="0">
+              <a:schemeClr val="dk1"/>
+            </a:effectRef>
+            <a:fontRef idx="minor">
+              <a:schemeClr val="dk1"/>
+            </a:fontRef>
+          </p:style>
+          <p:txBody>
+            <a:bodyPr rtlCol="0" anchor="ctr"/>
+            <a:lstStyle/>
+            <a:p>
+              <a:pPr algn="ctr"/>
+              <a:r>
+                <a:rPr lang="en-US" dirty="0" smtClean="0"/>
+                <a:t>Image for the </a:t>
+              </a:r>
+            </a:p>
+            <a:p>
+              <a:pPr algn="ctr"/>
+              <a:r>
+                <a:rPr lang="en-US" dirty="0" smtClean="0"/>
+                <a:t>left eye</a:t>
+              </a:r>
+              <a:endParaRPr lang="en-US" dirty="0"/>
+            </a:p>
+          </p:txBody>
+        </p:sp>
+        <p:sp>
+          <p:nvSpPr>
+            <p:cNvPr id="10" name="Retângulo de cantos arredondados 9"/>
+            <p:cNvSpPr/>
+            <p:nvPr/>
+          </p:nvSpPr>
+          <p:spPr>
+            <a:xfrm>
+              <a:off x="5148064" y="44624"/>
+              <a:ext cx="1872208" cy="720080"/>
+            </a:xfrm>
+            <a:prstGeom prst="roundRect">
+              <a:avLst/>
+            </a:prstGeom>
+          </p:spPr>
+          <p:style>
+            <a:lnRef idx="2">
+              <a:schemeClr val="dk1"/>
+            </a:lnRef>
+            <a:fillRef idx="1">
+              <a:schemeClr val="lt1"/>
+            </a:fillRef>
+            <a:effectRef idx="0">
+              <a:schemeClr val="dk1"/>
+            </a:effectRef>
+            <a:fontRef idx="minor">
+              <a:schemeClr val="dk1"/>
+            </a:fontRef>
+          </p:style>
+          <p:txBody>
+            <a:bodyPr rtlCol="0" anchor="ctr"/>
+            <a:lstStyle/>
+            <a:p>
+              <a:pPr algn="ctr"/>
+              <a:r>
+                <a:rPr lang="en-US" smtClean="0"/>
+                <a:t>Image for the right eye</a:t>
+              </a:r>
+              <a:endParaRPr lang="en-US"/>
+            </a:p>
+          </p:txBody>
+        </p:sp>
+        <p:sp>
+          <p:nvSpPr>
+            <p:cNvPr id="11" name="Retângulo 10"/>
+            <p:cNvSpPr/>
+            <p:nvPr/>
+          </p:nvSpPr>
+          <p:spPr>
+            <a:xfrm>
+              <a:off x="2474175" y="1124744"/>
+              <a:ext cx="4104456" cy="504056"/>
+            </a:xfrm>
+            <a:prstGeom prst="rect">
+              <a:avLst/>
+            </a:prstGeom>
+            <a:solidFill>
+              <a:schemeClr val="accent1">
+                <a:lumMod val="60000"/>
+                <a:lumOff val="40000"/>
+              </a:schemeClr>
+            </a:solidFill>
+            <a:ln>
+              <a:solidFill>
+                <a:schemeClr val="accent1"/>
+              </a:solidFill>
+            </a:ln>
+          </p:spPr>
+          <p:style>
+            <a:lnRef idx="2">
+              <a:schemeClr val="accent5">
+                <a:shade val="50000"/>
+              </a:schemeClr>
+            </a:lnRef>
+            <a:fillRef idx="1">
+              <a:schemeClr val="accent5"/>
+            </a:fillRef>
+            <a:effectRef idx="0">
+              <a:schemeClr val="accent5"/>
+            </a:effectRef>
+            <a:fontRef idx="minor">
+              <a:schemeClr val="lt1"/>
+            </a:fontRef>
+          </p:style>
+          <p:txBody>
+            <a:bodyPr rtlCol="0" anchor="ctr"/>
+            <a:lstStyle/>
+            <a:p>
+              <a:pPr algn="ctr"/>
+              <a:r>
+                <a:rPr lang="en-US" dirty="0" smtClean="0"/>
+                <a:t>ANAGLYPH CREATION</a:t>
+              </a:r>
+              <a:endParaRPr lang="en-US" dirty="0"/>
+            </a:p>
+          </p:txBody>
+        </p:sp>
+        <p:sp>
+          <p:nvSpPr>
+            <p:cNvPr id="12" name="Retângulo 11"/>
+            <p:cNvSpPr/>
+            <p:nvPr/>
+          </p:nvSpPr>
+          <p:spPr>
+            <a:xfrm>
+              <a:off x="1691680" y="3070773"/>
+              <a:ext cx="2592288" cy="360040"/>
+            </a:xfrm>
+            <a:prstGeom prst="rect">
+              <a:avLst/>
+            </a:prstGeom>
+            <a:solidFill>
+              <a:schemeClr val="accent1">
+                <a:lumMod val="60000"/>
+                <a:lumOff val="40000"/>
+              </a:schemeClr>
+            </a:solidFill>
+            <a:ln>
+              <a:solidFill>
+                <a:schemeClr val="accent1"/>
+              </a:solidFill>
+            </a:ln>
+          </p:spPr>
+          <p:style>
+            <a:lnRef idx="2">
+              <a:schemeClr val="accent5">
+                <a:shade val="50000"/>
+              </a:schemeClr>
+            </a:lnRef>
+            <a:fillRef idx="1">
+              <a:schemeClr val="accent5"/>
+            </a:fillRef>
+            <a:effectRef idx="0">
+              <a:schemeClr val="accent5"/>
+            </a:effectRef>
+            <a:fontRef idx="minor">
+              <a:schemeClr val="lt1"/>
+            </a:fontRef>
+          </p:style>
+          <p:txBody>
+            <a:bodyPr rtlCol="0" anchor="ctr"/>
+            <a:lstStyle/>
+            <a:p>
+              <a:pPr algn="ctr"/>
+              <a:r>
+                <a:rPr lang="en-US" sz="1400" smtClean="0"/>
+                <a:t>RGB -&gt; YC</a:t>
+              </a:r>
+              <a:r>
+                <a:rPr lang="en-US" sz="1400" baseline="-25000" smtClean="0"/>
+                <a:t>b</a:t>
+              </a:r>
+              <a:r>
+                <a:rPr lang="en-US" sz="1400" smtClean="0"/>
+                <a:t>C</a:t>
+              </a:r>
+              <a:r>
+                <a:rPr lang="en-US" sz="1400" baseline="-25000" smtClean="0"/>
+                <a:t>r</a:t>
+              </a:r>
+              <a:endParaRPr lang="en-US" sz="1400"/>
+            </a:p>
+          </p:txBody>
+        </p:sp>
+        <p:sp>
+          <p:nvSpPr>
+            <p:cNvPr id="13" name="Retângulo 12"/>
+            <p:cNvSpPr/>
+            <p:nvPr/>
+          </p:nvSpPr>
+          <p:spPr>
+            <a:xfrm>
+              <a:off x="4788024" y="3068960"/>
+              <a:ext cx="2592288" cy="360040"/>
+            </a:xfrm>
+            <a:prstGeom prst="rect">
+              <a:avLst/>
+            </a:prstGeom>
+            <a:solidFill>
+              <a:schemeClr val="accent1">
+                <a:lumMod val="60000"/>
+                <a:lumOff val="40000"/>
+              </a:schemeClr>
+            </a:solidFill>
+            <a:ln>
+              <a:solidFill>
+                <a:schemeClr val="accent1"/>
+              </a:solidFill>
+            </a:ln>
+          </p:spPr>
+          <p:style>
+            <a:lnRef idx="2">
+              <a:schemeClr val="accent5">
+                <a:shade val="50000"/>
+              </a:schemeClr>
+            </a:lnRef>
+            <a:fillRef idx="1">
+              <a:schemeClr val="accent5"/>
+            </a:fillRef>
+            <a:effectRef idx="0">
+              <a:schemeClr val="accent5"/>
+            </a:effectRef>
+            <a:fontRef idx="minor">
+              <a:schemeClr val="lt1"/>
+            </a:fontRef>
+          </p:style>
+          <p:txBody>
+            <a:bodyPr rtlCol="0" anchor="ctr"/>
+            <a:lstStyle/>
+            <a:p>
+              <a:pPr algn="ctr"/>
+              <a:r>
+                <a:rPr lang="en-US" sz="1400" smtClean="0"/>
+                <a:t>RGB -&gt; YC</a:t>
+              </a:r>
+              <a:r>
+                <a:rPr lang="en-US" sz="1400" baseline="-25000" smtClean="0"/>
+                <a:t>b</a:t>
+              </a:r>
+              <a:r>
+                <a:rPr lang="en-US" sz="1400" smtClean="0"/>
+                <a:t>C</a:t>
+              </a:r>
+              <a:r>
+                <a:rPr lang="en-US" sz="1400" baseline="-25000" smtClean="0"/>
+                <a:t>r</a:t>
+              </a:r>
+              <a:endParaRPr lang="en-US" sz="1400"/>
+            </a:p>
+          </p:txBody>
+        </p:sp>
+        <p:sp>
+          <p:nvSpPr>
+            <p:cNvPr id="14" name="Retângulo 13"/>
+            <p:cNvSpPr/>
+            <p:nvPr/>
+          </p:nvSpPr>
+          <p:spPr>
+            <a:xfrm>
+              <a:off x="1691680" y="3502821"/>
+              <a:ext cx="2592288" cy="360040"/>
+            </a:xfrm>
+            <a:prstGeom prst="rect">
+              <a:avLst/>
+            </a:prstGeom>
+            <a:solidFill>
+              <a:schemeClr val="accent1">
+                <a:lumMod val="60000"/>
+                <a:lumOff val="40000"/>
+              </a:schemeClr>
+            </a:solidFill>
+            <a:ln>
+              <a:solidFill>
+                <a:schemeClr val="accent1"/>
+              </a:solidFill>
+            </a:ln>
+          </p:spPr>
+          <p:style>
+            <a:lnRef idx="2">
+              <a:schemeClr val="accent5">
+                <a:shade val="50000"/>
+              </a:schemeClr>
+            </a:lnRef>
+            <a:fillRef idx="1">
+              <a:schemeClr val="accent5"/>
+            </a:fillRef>
+            <a:effectRef idx="0">
+              <a:schemeClr val="accent5"/>
+            </a:effectRef>
+            <a:fontRef idx="minor">
+              <a:schemeClr val="lt1"/>
+            </a:fontRef>
+          </p:style>
+          <p:txBody>
+            <a:bodyPr rtlCol="0" anchor="ctr"/>
+            <a:lstStyle/>
+            <a:p>
+              <a:pPr algn="ctr"/>
+              <a:r>
+                <a:rPr lang="en-US" sz="1400" dirty="0" smtClean="0"/>
+                <a:t>CHROMINANCE SUBSAMPLING</a:t>
+              </a:r>
+              <a:endParaRPr lang="en-US" sz="1400" dirty="0"/>
+            </a:p>
+          </p:txBody>
+        </p:sp>
+        <p:sp>
+          <p:nvSpPr>
+            <p:cNvPr id="15" name="Retângulo 14"/>
+            <p:cNvSpPr/>
+            <p:nvPr/>
+          </p:nvSpPr>
+          <p:spPr>
+            <a:xfrm>
+              <a:off x="4788024" y="3502821"/>
+              <a:ext cx="2592288" cy="360040"/>
+            </a:xfrm>
+            <a:prstGeom prst="rect">
+              <a:avLst/>
+            </a:prstGeom>
+            <a:solidFill>
+              <a:schemeClr val="accent1">
+                <a:lumMod val="60000"/>
+                <a:lumOff val="40000"/>
+              </a:schemeClr>
+            </a:solidFill>
+            <a:ln>
+              <a:solidFill>
+                <a:schemeClr val="accent1"/>
+              </a:solidFill>
+            </a:ln>
+          </p:spPr>
+          <p:style>
+            <a:lnRef idx="2">
+              <a:schemeClr val="accent5">
+                <a:shade val="50000"/>
+              </a:schemeClr>
+            </a:lnRef>
+            <a:fillRef idx="1">
+              <a:schemeClr val="accent5"/>
+            </a:fillRef>
+            <a:effectRef idx="0">
+              <a:schemeClr val="accent5"/>
+            </a:effectRef>
+            <a:fontRef idx="minor">
+              <a:schemeClr val="lt1"/>
+            </a:fontRef>
+          </p:style>
+          <p:txBody>
+            <a:bodyPr rtlCol="0" anchor="ctr"/>
+            <a:lstStyle/>
+            <a:p>
+              <a:pPr algn="ctr"/>
+              <a:r>
+                <a:rPr lang="en-US" sz="1400" dirty="0"/>
+                <a:t>CHROMINANCE SUBSAMPLING</a:t>
+              </a:r>
+            </a:p>
+          </p:txBody>
+        </p:sp>
+        <p:sp>
+          <p:nvSpPr>
+            <p:cNvPr id="16" name="Retângulo 15"/>
+            <p:cNvSpPr/>
+            <p:nvPr/>
+          </p:nvSpPr>
+          <p:spPr>
+            <a:xfrm>
+              <a:off x="4787668" y="4005064"/>
+              <a:ext cx="2592288" cy="360040"/>
+            </a:xfrm>
+            <a:prstGeom prst="rect">
+              <a:avLst/>
+            </a:prstGeom>
+            <a:solidFill>
+              <a:schemeClr val="accent1">
+                <a:lumMod val="60000"/>
+                <a:lumOff val="40000"/>
+              </a:schemeClr>
+            </a:solidFill>
+            <a:ln>
+              <a:solidFill>
+                <a:schemeClr val="accent1"/>
+              </a:solidFill>
+            </a:ln>
+          </p:spPr>
+          <p:style>
+            <a:lnRef idx="2">
+              <a:schemeClr val="accent5">
+                <a:shade val="50000"/>
+              </a:schemeClr>
+            </a:lnRef>
+            <a:fillRef idx="1">
+              <a:schemeClr val="accent5"/>
+            </a:fillRef>
+            <a:effectRef idx="0">
+              <a:schemeClr val="accent5"/>
+            </a:effectRef>
+            <a:fontRef idx="minor">
+              <a:schemeClr val="lt1"/>
+            </a:fontRef>
+          </p:style>
+          <p:txBody>
+            <a:bodyPr rtlCol="0" anchor="ctr"/>
+            <a:lstStyle/>
+            <a:p>
+              <a:pPr algn="ctr"/>
+              <a:r>
+                <a:rPr lang="en-US" sz="1400" smtClean="0"/>
+                <a:t>Luminance removal</a:t>
+              </a:r>
+              <a:endParaRPr lang="en-US" sz="1400" dirty="0"/>
+            </a:p>
+          </p:txBody>
+        </p:sp>
+        <p:sp>
+          <p:nvSpPr>
+            <p:cNvPr id="17" name="Retângulo de cantos arredondados 16"/>
+            <p:cNvSpPr/>
+            <p:nvPr/>
+          </p:nvSpPr>
+          <p:spPr>
+            <a:xfrm>
+              <a:off x="3649101" y="5157192"/>
+              <a:ext cx="1872208" cy="720080"/>
+            </a:xfrm>
+            <a:prstGeom prst="roundRect">
+              <a:avLst/>
+            </a:prstGeom>
+          </p:spPr>
+          <p:style>
+            <a:lnRef idx="2">
+              <a:schemeClr val="dk1"/>
+            </a:lnRef>
+            <a:fillRef idx="1">
+              <a:schemeClr val="lt1"/>
+            </a:fillRef>
+            <a:effectRef idx="0">
+              <a:schemeClr val="dk1"/>
+            </a:effectRef>
+            <a:fontRef idx="minor">
+              <a:schemeClr val="dk1"/>
+            </a:fontRef>
+          </p:style>
+          <p:txBody>
+            <a:bodyPr rtlCol="0" anchor="ctr"/>
+            <a:lstStyle/>
+            <a:p>
+              <a:pPr algn="ctr"/>
+              <a:r>
+                <a:rPr lang="en-US" dirty="0" smtClean="0"/>
+                <a:t>Compressed file</a:t>
+              </a:r>
+              <a:endParaRPr lang="en-US" dirty="0"/>
+            </a:p>
+          </p:txBody>
+        </p:sp>
+        <p:cxnSp>
+          <p:nvCxnSpPr>
+            <p:cNvPr id="22" name="Conector de seta reta 21"/>
+            <p:cNvCxnSpPr/>
+            <p:nvPr/>
+          </p:nvCxnSpPr>
+          <p:spPr>
+            <a:xfrm>
+              <a:off x="6084168" y="764704"/>
+              <a:ext cx="0" cy="360040"/>
+            </a:xfrm>
+            <a:prstGeom prst="straightConnector1">
+              <a:avLst/>
+            </a:prstGeom>
+            <a:ln w="28575">
+              <a:tailEnd type="arrow"/>
+            </a:ln>
+          </p:spPr>
+          <p:style>
+            <a:lnRef idx="1">
+              <a:schemeClr val="dk1"/>
+            </a:lnRef>
+            <a:fillRef idx="0">
+              <a:schemeClr val="dk1"/>
+            </a:fillRef>
+            <a:effectRef idx="0">
+              <a:schemeClr val="dk1"/>
+            </a:effectRef>
+            <a:fontRef idx="minor">
+              <a:schemeClr val="tx1"/>
+            </a:fontRef>
+          </p:style>
+        </p:cxnSp>
+        <p:cxnSp>
+          <p:nvCxnSpPr>
+            <p:cNvPr id="23" name="Conector de seta reta 22"/>
+            <p:cNvCxnSpPr/>
+            <p:nvPr/>
+          </p:nvCxnSpPr>
+          <p:spPr>
+            <a:xfrm>
+              <a:off x="2988180" y="764704"/>
+              <a:ext cx="0" cy="360040"/>
+            </a:xfrm>
+            <a:prstGeom prst="straightConnector1">
+              <a:avLst/>
+            </a:prstGeom>
+            <a:ln w="28575">
+              <a:tailEnd type="arrow"/>
+            </a:ln>
+          </p:spPr>
+          <p:style>
+            <a:lnRef idx="1">
+              <a:schemeClr val="dk1"/>
+            </a:lnRef>
+            <a:fillRef idx="0">
+              <a:schemeClr val="dk1"/>
+            </a:fillRef>
+            <a:effectRef idx="0">
+              <a:schemeClr val="dk1"/>
+            </a:effectRef>
+            <a:fontRef idx="minor">
+              <a:schemeClr val="tx1"/>
+            </a:fontRef>
+          </p:style>
+        </p:cxnSp>
+        <p:cxnSp>
+          <p:nvCxnSpPr>
+            <p:cNvPr id="24" name="Conector de seta reta 23"/>
+            <p:cNvCxnSpPr/>
+            <p:nvPr/>
+          </p:nvCxnSpPr>
+          <p:spPr>
+            <a:xfrm>
+              <a:off x="6083812" y="1628800"/>
+              <a:ext cx="0" cy="360040"/>
+            </a:xfrm>
+            <a:prstGeom prst="straightConnector1">
+              <a:avLst/>
+            </a:prstGeom>
+            <a:ln w="28575">
+              <a:tailEnd type="arrow"/>
+            </a:ln>
+          </p:spPr>
+          <p:style>
+            <a:lnRef idx="1">
+              <a:schemeClr val="dk1"/>
+            </a:lnRef>
+            <a:fillRef idx="0">
+              <a:schemeClr val="dk1"/>
+            </a:fillRef>
+            <a:effectRef idx="0">
+              <a:schemeClr val="dk1"/>
+            </a:effectRef>
+            <a:fontRef idx="minor">
+              <a:schemeClr val="tx1"/>
+            </a:fontRef>
+          </p:style>
+        </p:cxnSp>
+        <p:cxnSp>
+          <p:nvCxnSpPr>
+            <p:cNvPr id="25" name="Conector de seta reta 24"/>
+            <p:cNvCxnSpPr/>
+            <p:nvPr/>
+          </p:nvCxnSpPr>
+          <p:spPr>
+            <a:xfrm>
+              <a:off x="2987824" y="1628800"/>
+              <a:ext cx="0" cy="360040"/>
+            </a:xfrm>
+            <a:prstGeom prst="straightConnector1">
+              <a:avLst/>
+            </a:prstGeom>
+            <a:ln w="28575">
+              <a:tailEnd type="arrow"/>
+            </a:ln>
+          </p:spPr>
+          <p:style>
+            <a:lnRef idx="1">
+              <a:schemeClr val="dk1"/>
+            </a:lnRef>
+            <a:fillRef idx="0">
+              <a:schemeClr val="dk1"/>
+            </a:fillRef>
+            <a:effectRef idx="0">
+              <a:schemeClr val="dk1"/>
+            </a:effectRef>
+            <a:fontRef idx="minor">
+              <a:schemeClr val="tx1"/>
+            </a:fontRef>
+          </p:style>
+        </p:cxnSp>
+        <p:sp>
+          <p:nvSpPr>
+            <p:cNvPr id="26" name="Retângulo 25"/>
+            <p:cNvSpPr/>
+            <p:nvPr/>
+          </p:nvSpPr>
+          <p:spPr>
+            <a:xfrm>
+              <a:off x="3289061" y="4468976"/>
+              <a:ext cx="2592288" cy="360040"/>
+            </a:xfrm>
+            <a:prstGeom prst="rect">
+              <a:avLst/>
+            </a:prstGeom>
+            <a:solidFill>
+              <a:schemeClr val="accent1">
+                <a:lumMod val="60000"/>
+                <a:lumOff val="40000"/>
+              </a:schemeClr>
+            </a:solidFill>
+            <a:ln>
+              <a:solidFill>
+                <a:schemeClr val="accent1"/>
+              </a:solidFill>
+            </a:ln>
+          </p:spPr>
+          <p:style>
+            <a:lnRef idx="2">
+              <a:schemeClr val="accent5">
+                <a:shade val="50000"/>
+              </a:schemeClr>
+            </a:lnRef>
+            <a:fillRef idx="1">
+              <a:schemeClr val="accent5"/>
+            </a:fillRef>
+            <a:effectRef idx="0">
+              <a:schemeClr val="accent5"/>
+            </a:effectRef>
+            <a:fontRef idx="minor">
+              <a:schemeClr val="lt1"/>
+            </a:fontRef>
+          </p:style>
+          <p:txBody>
+            <a:bodyPr rtlCol="0" anchor="ctr"/>
+            <a:lstStyle/>
+            <a:p>
+              <a:pPr algn="ctr"/>
+              <a:r>
+                <a:rPr lang="en-US" sz="1400" dirty="0" smtClean="0"/>
+                <a:t>Lossless codification</a:t>
+              </a:r>
+              <a:endParaRPr lang="en-US" sz="1400" dirty="0"/>
+            </a:p>
+          </p:txBody>
+        </p:sp>
+        <p:cxnSp>
+          <p:nvCxnSpPr>
+            <p:cNvPr id="27" name="Conector de seta reta 26"/>
+            <p:cNvCxnSpPr>
+              <a:stCxn id="26" idx="2"/>
+            </p:cNvCxnSpPr>
+            <p:nvPr/>
+          </p:nvCxnSpPr>
+          <p:spPr>
+            <a:xfrm>
+              <a:off x="4585205" y="4829016"/>
+              <a:ext cx="0" cy="328176"/>
+            </a:xfrm>
+            <a:prstGeom prst="straightConnector1">
+              <a:avLst/>
+            </a:prstGeom>
+            <a:ln w="28575">
+              <a:tailEnd type="arrow"/>
+            </a:ln>
+          </p:spPr>
+          <p:style>
+            <a:lnRef idx="1">
+              <a:schemeClr val="dk1"/>
+            </a:lnRef>
+            <a:fillRef idx="0">
+              <a:schemeClr val="dk1"/>
+            </a:fillRef>
+            <a:effectRef idx="0">
+              <a:schemeClr val="dk1"/>
+            </a:effectRef>
+            <a:fontRef idx="minor">
+              <a:schemeClr val="tx1"/>
+            </a:fontRef>
+          </p:style>
+        </p:cxnSp>
+        <p:sp>
+          <p:nvSpPr>
+            <p:cNvPr id="30" name="Retângulo 29"/>
+            <p:cNvSpPr/>
+            <p:nvPr/>
+          </p:nvSpPr>
+          <p:spPr>
+            <a:xfrm>
+              <a:off x="1547664" y="2996953"/>
+              <a:ext cx="5976664" cy="932802"/>
+            </a:xfrm>
+            <a:prstGeom prst="rect">
+              <a:avLst/>
+            </a:prstGeom>
+            <a:noFill/>
+            <a:ln w="12700">
+              <a:prstDash val="dash"/>
+            </a:ln>
+          </p:spPr>
+          <p:style>
+            <a:lnRef idx="2">
+              <a:schemeClr val="dk1"/>
+            </a:lnRef>
+            <a:fillRef idx="1">
+              <a:schemeClr val="lt1"/>
+            </a:fillRef>
+            <a:effectRef idx="0">
+              <a:schemeClr val="dk1"/>
+            </a:effectRef>
+            <a:fontRef idx="minor">
+              <a:schemeClr val="dk1"/>
+            </a:fontRef>
+          </p:style>
+          <p:txBody>
+            <a:bodyPr rtlCol="0" anchor="ctr"/>
+            <a:lstStyle/>
+            <a:p>
+              <a:pPr algn="ctr"/>
+              <a:endParaRPr lang="en-US"/>
+            </a:p>
+          </p:txBody>
+        </p:sp>
+        <p:sp>
+          <p:nvSpPr>
+            <p:cNvPr id="31" name="CaixaDeTexto 30"/>
+            <p:cNvSpPr txBox="1"/>
+            <p:nvPr/>
+          </p:nvSpPr>
+          <p:spPr>
+            <a:xfrm>
+              <a:off x="7452320" y="3261536"/>
+              <a:ext cx="504056" cy="338554"/>
+            </a:xfrm>
+            <a:prstGeom prst="rect">
+              <a:avLst/>
+            </a:prstGeom>
+            <a:noFill/>
+          </p:spPr>
+          <p:txBody>
+            <a:bodyPr wrap="square" rtlCol="0">
+              <a:spAutoFit/>
+            </a:bodyPr>
+            <a:lstStyle/>
+            <a:p>
+              <a:r>
+                <a:rPr lang="en-US" sz="1600" dirty="0" smtClean="0"/>
+                <a:t>(III)</a:t>
+              </a:r>
+              <a:endParaRPr lang="en-US" sz="1600" dirty="0"/>
+            </a:p>
+          </p:txBody>
+        </p:sp>
+        <p:sp>
+          <p:nvSpPr>
+            <p:cNvPr id="33" name="CaixaDeTexto 32"/>
+            <p:cNvSpPr txBox="1"/>
+            <p:nvPr/>
+          </p:nvSpPr>
+          <p:spPr>
+            <a:xfrm>
+              <a:off x="4017130" y="2179603"/>
+              <a:ext cx="576064" cy="338554"/>
+            </a:xfrm>
+            <a:prstGeom prst="rect">
+              <a:avLst/>
+            </a:prstGeom>
+            <a:noFill/>
+          </p:spPr>
+          <p:txBody>
+            <a:bodyPr wrap="square" rtlCol="0">
+              <a:spAutoFit/>
+            </a:bodyPr>
+            <a:lstStyle/>
+            <a:p>
+              <a:r>
+                <a:rPr lang="en-US" sz="1600" dirty="0" smtClean="0"/>
+                <a:t>(I)</a:t>
+              </a:r>
+              <a:endParaRPr lang="en-US" sz="1600" dirty="0"/>
+            </a:p>
+          </p:txBody>
+        </p:sp>
+        <p:sp>
+          <p:nvSpPr>
+            <p:cNvPr id="34" name="CaixaDeTexto 33"/>
+            <p:cNvSpPr txBox="1"/>
+            <p:nvPr/>
+          </p:nvSpPr>
+          <p:spPr>
+            <a:xfrm>
+              <a:off x="7135510" y="2179603"/>
+              <a:ext cx="576064" cy="338554"/>
+            </a:xfrm>
+            <a:prstGeom prst="rect">
+              <a:avLst/>
+            </a:prstGeom>
+            <a:noFill/>
+          </p:spPr>
+          <p:txBody>
+            <a:bodyPr wrap="square" rtlCol="0">
+              <a:spAutoFit/>
+            </a:bodyPr>
+            <a:lstStyle/>
+            <a:p>
+              <a:r>
+                <a:rPr lang="en-US" sz="1600" dirty="0" smtClean="0"/>
+                <a:t>(II)</a:t>
+              </a:r>
+              <a:endParaRPr lang="en-US" sz="1600" dirty="0"/>
+            </a:p>
+          </p:txBody>
+        </p:sp>
+        <p:sp>
+          <p:nvSpPr>
+            <p:cNvPr id="35" name="CaixaDeTexto 34"/>
+            <p:cNvSpPr txBox="1"/>
+            <p:nvPr/>
+          </p:nvSpPr>
+          <p:spPr>
+            <a:xfrm>
+              <a:off x="7452320" y="4015807"/>
+              <a:ext cx="504056" cy="338554"/>
+            </a:xfrm>
+            <a:prstGeom prst="rect">
+              <a:avLst/>
+            </a:prstGeom>
+            <a:noFill/>
+          </p:spPr>
+          <p:txBody>
+            <a:bodyPr wrap="square" rtlCol="0">
+              <a:spAutoFit/>
+            </a:bodyPr>
+            <a:lstStyle/>
+            <a:p>
+              <a:r>
+                <a:rPr lang="en-US" sz="1600" dirty="0" smtClean="0"/>
+                <a:t>(IV)</a:t>
+              </a:r>
+              <a:endParaRPr lang="en-US" sz="1600" dirty="0"/>
+            </a:p>
+          </p:txBody>
+        </p:sp>
+      </p:grpSp>
+    </p:spTree>
+    <p:extLst>
+      <p:ext uri="{BB962C8B-B14F-4D97-AF65-F5344CB8AC3E}">
+        <p14:creationId xmlns:p14="http://schemas.microsoft.com/office/powerpoint/2010/main" val="1965644353"/>
+      </p:ext>
+    </p:extLst>
+  </p:cSld>
+  <p:clrMapOvr>
+    <a:masterClrMapping/>
+  </p:clrMapOvr>
+</p:sld>
+</file>
+
+<file path=ppt/slides/slide14.xml><?xml version="1.0" encoding="utf-8"?>
+<p:sld xmlns:a="http://schemas.openxmlformats.org/drawingml/2006/main" xmlns:r="http://schemas.openxmlformats.org/officeDocument/2006/relationships" xmlns:p="http://schemas.openxmlformats.org/presentationml/2006/main">
+  <p:cSld>
+    <p:spTree>
+      <p:nvGrpSpPr>
+        <p:cNvPr id="1" name=""/>
+        <p:cNvGrpSpPr/>
+        <p:nvPr/>
+      </p:nvGrpSpPr>
+      <p:grpSpPr>
+        <a:xfrm>
+          <a:off x="0" y="0"/>
+          <a:ext cx="0" cy="0"/>
+          <a:chOff x="0" y="0"/>
+          <a:chExt cx="0" cy="0"/>
+        </a:xfrm>
+      </p:grpSpPr>
+      <p:sp>
+        <p:nvSpPr>
+          <p:cNvPr id="2" name="Título 1"/>
+          <p:cNvSpPr>
+            <a:spLocks noGrp="1"/>
+          </p:cNvSpPr>
+          <p:nvPr>
+            <p:ph type="title"/>
+          </p:nvPr>
+        </p:nvSpPr>
+        <p:spPr/>
+        <p:txBody>
+          <a:bodyPr/>
+          <a:lstStyle/>
+          <a:p>
+            <a:r>
+              <a:rPr lang="pt-BR" dirty="0" err="1" smtClean="0"/>
+              <a:t>Anaglyph</a:t>
+            </a:r>
+            <a:r>
+              <a:rPr lang="pt-BR" dirty="0" smtClean="0"/>
+              <a:t> </a:t>
+            </a:r>
+            <a:r>
+              <a:rPr lang="pt-BR" dirty="0" err="1" smtClean="0"/>
+              <a:t>Reversion</a:t>
+            </a:r>
+            <a:r>
+              <a:rPr lang="pt-BR" dirty="0" smtClean="0"/>
+              <a:t> </a:t>
+            </a:r>
+            <a:r>
+              <a:rPr lang="pt-BR" dirty="0" err="1" smtClean="0"/>
+              <a:t>Process</a:t>
+            </a:r>
+            <a:endParaRPr lang="pt-BR" dirty="0"/>
+          </a:p>
+        </p:txBody>
+      </p:sp>
+      <p:grpSp>
+        <p:nvGrpSpPr>
+          <p:cNvPr id="39" name="Grupo 38"/>
+          <p:cNvGrpSpPr/>
+          <p:nvPr/>
+        </p:nvGrpSpPr>
+        <p:grpSpPr>
+          <a:xfrm>
+            <a:off x="2425475" y="1583025"/>
+            <a:ext cx="4882829" cy="4420916"/>
+            <a:chOff x="2425475" y="1583025"/>
+            <a:chExt cx="4882829" cy="4420916"/>
+          </a:xfrm>
+        </p:grpSpPr>
+        <p:cxnSp>
+          <p:nvCxnSpPr>
+            <p:cNvPr id="5" name="Conector angulado 4"/>
+            <p:cNvCxnSpPr>
+              <a:endCxn id="9" idx="3"/>
+            </p:cNvCxnSpPr>
+            <p:nvPr/>
+          </p:nvCxnSpPr>
+          <p:spPr>
+            <a:xfrm rot="5400000">
+              <a:off x="2997088" y="4443098"/>
+              <a:ext cx="2296463" cy="266507"/>
+            </a:xfrm>
+            <a:prstGeom prst="bentConnector2">
+              <a:avLst/>
+            </a:prstGeom>
+            <a:ln w="28575">
+              <a:tailEnd type="arrow"/>
+            </a:ln>
+          </p:spPr>
+          <p:style>
+            <a:lnRef idx="1">
+              <a:schemeClr val="dk1"/>
+            </a:lnRef>
+            <a:fillRef idx="0">
+              <a:schemeClr val="dk1"/>
+            </a:fillRef>
+            <a:effectRef idx="0">
+              <a:schemeClr val="dk1"/>
+            </a:effectRef>
+            <a:fontRef idx="minor">
+              <a:schemeClr val="tx1"/>
+            </a:fontRef>
+          </p:style>
+        </p:cxnSp>
+        <p:cxnSp>
+          <p:nvCxnSpPr>
+            <p:cNvPr id="6" name="Conector angulado 5"/>
+            <p:cNvCxnSpPr>
+              <a:endCxn id="33" idx="1"/>
+            </p:cNvCxnSpPr>
+            <p:nvPr/>
+          </p:nvCxnSpPr>
+          <p:spPr>
+            <a:xfrm rot="16200000" flipH="1">
+              <a:off x="3835760" y="3838629"/>
+              <a:ext cx="3486290" cy="285618"/>
+            </a:xfrm>
+            <a:prstGeom prst="bentConnector2">
+              <a:avLst/>
+            </a:prstGeom>
+            <a:ln w="28575">
+              <a:tailEnd type="arrow"/>
+            </a:ln>
+          </p:spPr>
+          <p:style>
+            <a:lnRef idx="1">
+              <a:schemeClr val="dk1"/>
+            </a:lnRef>
+            <a:fillRef idx="0">
+              <a:schemeClr val="dk1"/>
+            </a:fillRef>
+            <a:effectRef idx="0">
+              <a:schemeClr val="dk1"/>
+            </a:effectRef>
+            <a:fontRef idx="minor">
+              <a:schemeClr val="tx1"/>
+            </a:fontRef>
+          </p:style>
+        </p:cxnSp>
+        <p:sp>
+          <p:nvSpPr>
+            <p:cNvPr id="7" name="Retângulo de cantos arredondados 6"/>
+            <p:cNvSpPr/>
+            <p:nvPr/>
+          </p:nvSpPr>
+          <p:spPr>
+            <a:xfrm>
+              <a:off x="2915816" y="1919271"/>
+              <a:ext cx="1285352" cy="576063"/>
+            </a:xfrm>
+            <a:prstGeom prst="roundRect">
+              <a:avLst/>
+            </a:prstGeom>
+          </p:spPr>
+          <p:style>
+            <a:lnRef idx="2">
+              <a:schemeClr val="dk1"/>
+            </a:lnRef>
+            <a:fillRef idx="1">
+              <a:schemeClr val="lt1"/>
+            </a:fillRef>
+            <a:effectRef idx="0">
+              <a:schemeClr val="dk1"/>
+            </a:effectRef>
+            <a:fontRef idx="minor">
+              <a:schemeClr val="dk1"/>
+            </a:fontRef>
+          </p:style>
+          <p:txBody>
+            <a:bodyPr rtlCol="0" anchor="ctr"/>
+            <a:lstStyle/>
+            <a:p>
+              <a:pPr algn="ctr"/>
+              <a:r>
+                <a:rPr lang="en-US" dirty="0" err="1" smtClean="0"/>
+                <a:t>C</a:t>
+              </a:r>
+              <a:r>
+                <a:rPr lang="en-US" baseline="-25000" dirty="0" err="1" smtClean="0"/>
+                <a:t>b</a:t>
+              </a:r>
+              <a:r>
+                <a:rPr lang="en-US" dirty="0" smtClean="0"/>
+                <a:t>’</a:t>
+              </a:r>
+              <a:r>
+                <a:rPr lang="en-US" baseline="-25000" dirty="0" smtClean="0"/>
+                <a:t>   </a:t>
+              </a:r>
+              <a:r>
+                <a:rPr lang="en-US" dirty="0" smtClean="0"/>
+                <a:t>C</a:t>
+              </a:r>
+              <a:r>
+                <a:rPr lang="en-US" baseline="-25000" dirty="0" smtClean="0"/>
+                <a:t>r</a:t>
+              </a:r>
+              <a:r>
+                <a:rPr lang="en-US" dirty="0" smtClean="0"/>
+                <a:t>’</a:t>
+              </a:r>
+              <a:endParaRPr lang="en-US" dirty="0"/>
+            </a:p>
+          </p:txBody>
+        </p:sp>
+        <p:sp>
+          <p:nvSpPr>
+            <p:cNvPr id="9" name="Retângulo de cantos arredondados 8"/>
+            <p:cNvSpPr/>
+            <p:nvPr/>
+          </p:nvSpPr>
+          <p:spPr>
+            <a:xfrm>
+              <a:off x="2425475" y="5445224"/>
+              <a:ext cx="1586590" cy="558717"/>
+            </a:xfrm>
+            <a:prstGeom prst="roundRect">
+              <a:avLst/>
+            </a:prstGeom>
+          </p:spPr>
+          <p:style>
+            <a:lnRef idx="2">
+              <a:schemeClr val="dk1"/>
+            </a:lnRef>
+            <a:fillRef idx="1">
+              <a:schemeClr val="lt1"/>
+            </a:fillRef>
+            <a:effectRef idx="0">
+              <a:schemeClr val="dk1"/>
+            </a:effectRef>
+            <a:fontRef idx="minor">
+              <a:schemeClr val="dk1"/>
+            </a:fontRef>
+          </p:style>
+          <p:txBody>
+            <a:bodyPr rtlCol="0" anchor="ctr"/>
+            <a:lstStyle/>
+            <a:p>
+              <a:pPr algn="ctr"/>
+              <a:r>
+                <a:rPr lang="en-US" dirty="0" smtClean="0"/>
+                <a:t>Image for the </a:t>
+              </a:r>
+            </a:p>
+            <a:p>
+              <a:pPr algn="ctr"/>
+              <a:r>
+                <a:rPr lang="en-US" dirty="0" smtClean="0"/>
+                <a:t>left eye</a:t>
+              </a:r>
+              <a:endParaRPr lang="en-US" dirty="0"/>
+            </a:p>
+          </p:txBody>
+        </p:sp>
+        <p:sp>
+          <p:nvSpPr>
+            <p:cNvPr id="10" name="Retângulo de cantos arredondados 9"/>
+            <p:cNvSpPr/>
+            <p:nvPr/>
+          </p:nvSpPr>
+          <p:spPr>
+            <a:xfrm>
+              <a:off x="4891507" y="1916833"/>
+              <a:ext cx="1285352" cy="576063"/>
+            </a:xfrm>
+            <a:prstGeom prst="roundRect">
+              <a:avLst/>
+            </a:prstGeom>
+          </p:spPr>
+          <p:style>
+            <a:lnRef idx="2">
+              <a:schemeClr val="dk1"/>
+            </a:lnRef>
+            <a:fillRef idx="1">
+              <a:schemeClr val="lt1"/>
+            </a:fillRef>
+            <a:effectRef idx="0">
+              <a:schemeClr val="dk1"/>
+            </a:effectRef>
+            <a:fontRef idx="minor">
+              <a:schemeClr val="dk1"/>
+            </a:fontRef>
+          </p:style>
+          <p:txBody>
+            <a:bodyPr rtlCol="0" anchor="ctr"/>
+            <a:lstStyle/>
+            <a:p>
+              <a:pPr algn="ctr"/>
+              <a:r>
+                <a:rPr lang="en-US" dirty="0" smtClean="0"/>
+                <a:t>Y   </a:t>
+              </a:r>
+              <a:r>
+                <a:rPr lang="en-US" dirty="0" err="1" smtClean="0"/>
+                <a:t>C</a:t>
+              </a:r>
+              <a:r>
+                <a:rPr lang="en-US" baseline="-25000" dirty="0" err="1" smtClean="0"/>
+                <a:t>b</a:t>
+              </a:r>
+              <a:r>
+                <a:rPr lang="en-US" baseline="-25000" dirty="0" smtClean="0"/>
+                <a:t>   </a:t>
+              </a:r>
+              <a:r>
+                <a:rPr lang="en-US" dirty="0" smtClean="0"/>
+                <a:t>C</a:t>
+              </a:r>
+              <a:r>
+                <a:rPr lang="en-US" baseline="-25000" dirty="0" smtClean="0"/>
+                <a:t>r</a:t>
+              </a:r>
+              <a:endParaRPr lang="en-US" dirty="0"/>
+            </a:p>
+          </p:txBody>
+        </p:sp>
+        <p:sp>
+          <p:nvSpPr>
+            <p:cNvPr id="12" name="Retângulo 11"/>
+            <p:cNvSpPr/>
+            <p:nvPr/>
+          </p:nvSpPr>
+          <p:spPr>
+            <a:xfrm>
+              <a:off x="3419872" y="4365104"/>
+              <a:ext cx="3024336" cy="360040"/>
+            </a:xfrm>
+            <a:prstGeom prst="rect">
+              <a:avLst/>
+            </a:prstGeom>
+            <a:solidFill>
+              <a:schemeClr val="accent1">
+                <a:lumMod val="60000"/>
+                <a:lumOff val="40000"/>
+              </a:schemeClr>
+            </a:solidFill>
+            <a:ln>
+              <a:solidFill>
+                <a:schemeClr val="accent1"/>
+              </a:solidFill>
+            </a:ln>
+          </p:spPr>
+          <p:style>
+            <a:lnRef idx="2">
+              <a:schemeClr val="accent5">
+                <a:shade val="50000"/>
+              </a:schemeClr>
+            </a:lnRef>
+            <a:fillRef idx="1">
+              <a:schemeClr val="accent5"/>
+            </a:fillRef>
+            <a:effectRef idx="0">
+              <a:schemeClr val="accent5"/>
+            </a:effectRef>
+            <a:fontRef idx="minor">
+              <a:schemeClr val="lt1"/>
+            </a:fontRef>
+          </p:style>
+          <p:txBody>
+            <a:bodyPr rtlCol="0" anchor="ctr"/>
+            <a:lstStyle/>
+            <a:p>
+              <a:pPr algn="ctr"/>
+              <a:r>
+                <a:rPr lang="en-US" sz="1400" dirty="0" smtClean="0"/>
+                <a:t>YC</a:t>
+              </a:r>
+              <a:r>
+                <a:rPr lang="en-US" sz="1400" baseline="-25000" dirty="0" smtClean="0"/>
+                <a:t>b</a:t>
+              </a:r>
+              <a:r>
+                <a:rPr lang="en-US" sz="1400" dirty="0" smtClean="0"/>
+                <a:t>C</a:t>
+              </a:r>
+              <a:r>
+                <a:rPr lang="en-US" sz="1400" baseline="-25000" dirty="0" smtClean="0"/>
+                <a:t>r</a:t>
+              </a:r>
+              <a:r>
+                <a:rPr lang="en-US" sz="1400" dirty="0" smtClean="0"/>
+                <a:t> -&gt; RGB</a:t>
+              </a:r>
+              <a:endParaRPr lang="en-US" sz="1400" dirty="0"/>
+            </a:p>
+          </p:txBody>
+        </p:sp>
+        <p:sp>
+          <p:nvSpPr>
+            <p:cNvPr id="14" name="Retângulo 13"/>
+            <p:cNvSpPr/>
+            <p:nvPr/>
+          </p:nvSpPr>
+          <p:spPr>
+            <a:xfrm>
+              <a:off x="3419872" y="3933056"/>
+              <a:ext cx="3024336" cy="360040"/>
+            </a:xfrm>
+            <a:prstGeom prst="rect">
+              <a:avLst/>
+            </a:prstGeom>
+            <a:solidFill>
+              <a:schemeClr val="accent1">
+                <a:lumMod val="60000"/>
+                <a:lumOff val="40000"/>
+              </a:schemeClr>
+            </a:solidFill>
+            <a:ln>
+              <a:solidFill>
+                <a:schemeClr val="accent1"/>
+              </a:solidFill>
+            </a:ln>
+          </p:spPr>
+          <p:style>
+            <a:lnRef idx="2">
+              <a:schemeClr val="accent5">
+                <a:shade val="50000"/>
+              </a:schemeClr>
+            </a:lnRef>
+            <a:fillRef idx="1">
+              <a:schemeClr val="accent5"/>
+            </a:fillRef>
+            <a:effectRef idx="0">
+              <a:schemeClr val="accent5"/>
+            </a:effectRef>
+            <a:fontRef idx="minor">
+              <a:schemeClr val="lt1"/>
+            </a:fontRef>
+          </p:style>
+          <p:txBody>
+            <a:bodyPr rtlCol="0" anchor="ctr"/>
+            <a:lstStyle/>
+            <a:p>
+              <a:pPr algn="ctr"/>
+              <a:r>
+                <a:rPr lang="en-US" sz="1400" dirty="0" smtClean="0"/>
+                <a:t>4:4:4 CHROMINANCE </a:t>
+              </a:r>
+              <a:r>
+                <a:rPr lang="en-US" sz="1400" dirty="0" smtClean="0"/>
+                <a:t>SUBSAMPLING</a:t>
+              </a:r>
+              <a:endParaRPr lang="en-US" sz="1400" dirty="0"/>
+            </a:p>
+          </p:txBody>
+        </p:sp>
+        <p:cxnSp>
+          <p:nvCxnSpPr>
+            <p:cNvPr id="18" name="Conector de seta reta 17"/>
+            <p:cNvCxnSpPr/>
+            <p:nvPr/>
+          </p:nvCxnSpPr>
+          <p:spPr>
+            <a:xfrm>
+              <a:off x="6197065" y="2024845"/>
+              <a:ext cx="0" cy="360040"/>
+            </a:xfrm>
+            <a:prstGeom prst="straightConnector1">
+              <a:avLst/>
+            </a:prstGeom>
+            <a:ln w="28575">
+              <a:tailEnd type="arrow"/>
+            </a:ln>
+          </p:spPr>
+          <p:style>
+            <a:lnRef idx="1">
+              <a:schemeClr val="dk1"/>
+            </a:lnRef>
+            <a:fillRef idx="0">
+              <a:schemeClr val="dk1"/>
+            </a:fillRef>
+            <a:effectRef idx="0">
+              <a:schemeClr val="dk1"/>
+            </a:effectRef>
+            <a:fontRef idx="minor">
+              <a:schemeClr val="tx1"/>
+            </a:fontRef>
+          </p:style>
+        </p:cxnSp>
+        <p:sp>
+          <p:nvSpPr>
+            <p:cNvPr id="22" name="Retângulo 21"/>
+            <p:cNvSpPr/>
+            <p:nvPr/>
+          </p:nvSpPr>
+          <p:spPr>
+            <a:xfrm>
+              <a:off x="3419872" y="4797152"/>
+              <a:ext cx="3024336" cy="360040"/>
+            </a:xfrm>
+            <a:prstGeom prst="rect">
+              <a:avLst/>
+            </a:prstGeom>
+            <a:solidFill>
+              <a:schemeClr val="accent1">
+                <a:lumMod val="60000"/>
+                <a:lumOff val="40000"/>
+              </a:schemeClr>
+            </a:solidFill>
+            <a:ln>
+              <a:solidFill>
+                <a:schemeClr val="accent1"/>
+              </a:solidFill>
+            </a:ln>
+          </p:spPr>
+          <p:style>
+            <a:lnRef idx="2">
+              <a:schemeClr val="accent5">
+                <a:shade val="50000"/>
+              </a:schemeClr>
+            </a:lnRef>
+            <a:fillRef idx="1">
+              <a:schemeClr val="accent5"/>
+            </a:fillRef>
+            <a:effectRef idx="0">
+              <a:schemeClr val="accent5"/>
+            </a:effectRef>
+            <a:fontRef idx="minor">
+              <a:schemeClr val="lt1"/>
+            </a:fontRef>
+          </p:style>
+          <p:txBody>
+            <a:bodyPr rtlCol="0" anchor="ctr"/>
+            <a:lstStyle/>
+            <a:p>
+              <a:pPr algn="ctr"/>
+              <a:r>
+                <a:rPr lang="en-US" sz="1400" dirty="0" smtClean="0"/>
+                <a:t>REORDERING OF COLOR COMPONENTS</a:t>
+              </a:r>
+              <a:endParaRPr lang="en-US" sz="1400" dirty="0"/>
+            </a:p>
+          </p:txBody>
+        </p:sp>
+        <p:sp>
+          <p:nvSpPr>
+            <p:cNvPr id="24" name="Retângulo 23"/>
+            <p:cNvSpPr/>
+            <p:nvPr/>
+          </p:nvSpPr>
+          <p:spPr>
+            <a:xfrm>
+              <a:off x="3157919" y="1844824"/>
+              <a:ext cx="2232248" cy="720080"/>
+            </a:xfrm>
+            <a:prstGeom prst="rect">
+              <a:avLst/>
+            </a:prstGeom>
+            <a:noFill/>
+            <a:ln w="25400">
+              <a:solidFill>
+                <a:schemeClr val="accent1"/>
+              </a:solidFill>
+              <a:prstDash val="dash"/>
+            </a:ln>
+          </p:spPr>
+          <p:style>
+            <a:lnRef idx="2">
+              <a:schemeClr val="dk1"/>
+            </a:lnRef>
+            <a:fillRef idx="1">
+              <a:schemeClr val="lt1"/>
+            </a:fillRef>
+            <a:effectRef idx="0">
+              <a:schemeClr val="dk1"/>
+            </a:effectRef>
+            <a:fontRef idx="minor">
+              <a:schemeClr val="dk1"/>
+            </a:fontRef>
+          </p:style>
+          <p:txBody>
+            <a:bodyPr rtlCol="0" anchor="ctr"/>
+            <a:lstStyle/>
+            <a:p>
+              <a:pPr algn="ctr"/>
+              <a:endParaRPr lang="en-US"/>
+            </a:p>
+          </p:txBody>
+        </p:sp>
+        <p:sp>
+          <p:nvSpPr>
+            <p:cNvPr id="26" name="CaixaDeTexto 25"/>
+            <p:cNvSpPr txBox="1"/>
+            <p:nvPr/>
+          </p:nvSpPr>
+          <p:spPr>
+            <a:xfrm>
+              <a:off x="2483768" y="2654259"/>
+              <a:ext cx="1566262" cy="523220"/>
+            </a:xfrm>
+            <a:prstGeom prst="rect">
+              <a:avLst/>
+            </a:prstGeom>
+            <a:noFill/>
+          </p:spPr>
+          <p:txBody>
+            <a:bodyPr wrap="square" rtlCol="0">
+              <a:spAutoFit/>
+            </a:bodyPr>
+            <a:lstStyle/>
+            <a:p>
+              <a:pPr algn="r"/>
+              <a:r>
+                <a:rPr lang="en-US" sz="1400" i="1" dirty="0" smtClean="0"/>
+                <a:t>Complementary anaglyph</a:t>
+              </a:r>
+              <a:endParaRPr lang="en-US" sz="1400" i="1" dirty="0"/>
+            </a:p>
+          </p:txBody>
+        </p:sp>
+        <p:sp>
+          <p:nvSpPr>
+            <p:cNvPr id="27" name="CaixaDeTexto 26"/>
+            <p:cNvSpPr txBox="1"/>
+            <p:nvPr/>
+          </p:nvSpPr>
+          <p:spPr>
+            <a:xfrm>
+              <a:off x="2843808" y="1583025"/>
+              <a:ext cx="1650788" cy="307777"/>
+            </a:xfrm>
+            <a:prstGeom prst="rect">
+              <a:avLst/>
+            </a:prstGeom>
+            <a:noFill/>
+          </p:spPr>
+          <p:txBody>
+            <a:bodyPr wrap="square" rtlCol="0">
+              <a:spAutoFit/>
+            </a:bodyPr>
+            <a:lstStyle/>
+            <a:p>
+              <a:r>
+                <a:rPr lang="en-US" sz="1400" i="1" dirty="0" smtClean="0"/>
+                <a:t>Color Index Table</a:t>
+              </a:r>
+              <a:endParaRPr lang="en-US" sz="1400" i="1" dirty="0"/>
+            </a:p>
+          </p:txBody>
+        </p:sp>
+        <p:sp>
+          <p:nvSpPr>
+            <p:cNvPr id="29" name="Retângulo de cantos arredondados 28"/>
+            <p:cNvSpPr/>
+            <p:nvPr/>
+          </p:nvSpPr>
+          <p:spPr>
+            <a:xfrm>
+              <a:off x="3631367" y="3140968"/>
+              <a:ext cx="1285352" cy="576063"/>
+            </a:xfrm>
+            <a:prstGeom prst="roundRect">
+              <a:avLst/>
+            </a:prstGeom>
+          </p:spPr>
+          <p:style>
+            <a:lnRef idx="2">
+              <a:schemeClr val="dk1"/>
+            </a:lnRef>
+            <a:fillRef idx="1">
+              <a:schemeClr val="lt1"/>
+            </a:fillRef>
+            <a:effectRef idx="0">
+              <a:schemeClr val="dk1"/>
+            </a:effectRef>
+            <a:fontRef idx="minor">
+              <a:schemeClr val="dk1"/>
+            </a:fontRef>
+          </p:style>
+          <p:txBody>
+            <a:bodyPr rtlCol="0" anchor="ctr"/>
+            <a:lstStyle/>
+            <a:p>
+              <a:pPr algn="ctr"/>
+              <a:r>
+                <a:rPr lang="en-US" dirty="0" smtClean="0"/>
+                <a:t>Y  </a:t>
+              </a:r>
+              <a:r>
+                <a:rPr lang="en-US" dirty="0" err="1" smtClean="0"/>
+                <a:t>C</a:t>
+              </a:r>
+              <a:r>
+                <a:rPr lang="en-US" baseline="-25000" dirty="0" err="1" smtClean="0"/>
+                <a:t>b</a:t>
+              </a:r>
+              <a:r>
+                <a:rPr lang="en-US" dirty="0" smtClean="0"/>
+                <a:t>’</a:t>
+              </a:r>
+              <a:r>
+                <a:rPr lang="en-US" baseline="-25000" dirty="0" smtClean="0"/>
+                <a:t>  </a:t>
+              </a:r>
+              <a:r>
+                <a:rPr lang="en-US" dirty="0" smtClean="0"/>
+                <a:t>C</a:t>
+              </a:r>
+              <a:r>
+                <a:rPr lang="en-US" baseline="-25000" dirty="0" smtClean="0"/>
+                <a:t>r</a:t>
+              </a:r>
+              <a:r>
+                <a:rPr lang="en-US" dirty="0" smtClean="0"/>
+                <a:t>’</a:t>
+              </a:r>
+              <a:endParaRPr lang="en-US" dirty="0"/>
+            </a:p>
+          </p:txBody>
+        </p:sp>
+        <p:sp>
+          <p:nvSpPr>
+            <p:cNvPr id="30" name="Seta para baixo 29"/>
+            <p:cNvSpPr/>
+            <p:nvPr/>
+          </p:nvSpPr>
+          <p:spPr>
+            <a:xfrm>
+              <a:off x="4160279" y="2601850"/>
+              <a:ext cx="195697" cy="491797"/>
+            </a:xfrm>
+            <a:prstGeom prst="downArrow">
+              <a:avLst/>
+            </a:prstGeom>
+            <a:solidFill>
+              <a:schemeClr val="accent1">
+                <a:lumMod val="60000"/>
+                <a:lumOff val="40000"/>
+              </a:schemeClr>
+            </a:solidFill>
+            <a:ln>
+              <a:solidFill>
+                <a:schemeClr val="accent1"/>
+              </a:solidFill>
+            </a:ln>
+          </p:spPr>
+          <p:style>
+            <a:lnRef idx="2">
+              <a:schemeClr val="accent1">
+                <a:shade val="50000"/>
+              </a:schemeClr>
+            </a:lnRef>
+            <a:fillRef idx="1">
+              <a:schemeClr val="accent1"/>
+            </a:fillRef>
+            <a:effectRef idx="0">
+              <a:schemeClr val="accent1"/>
+            </a:effectRef>
+            <a:fontRef idx="minor">
+              <a:schemeClr val="lt1"/>
+            </a:fontRef>
+          </p:style>
+          <p:txBody>
+            <a:bodyPr rtlCol="0" anchor="ctr"/>
+            <a:lstStyle/>
+            <a:p>
+              <a:pPr algn="ctr"/>
+              <a:endParaRPr lang="pt-BR"/>
+            </a:p>
+          </p:txBody>
+        </p:sp>
+        <p:sp>
+          <p:nvSpPr>
+            <p:cNvPr id="33" name="Retângulo de cantos arredondados 32"/>
+            <p:cNvSpPr/>
+            <p:nvPr/>
+          </p:nvSpPr>
+          <p:spPr>
+            <a:xfrm>
+              <a:off x="5721714" y="5445224"/>
+              <a:ext cx="1586590" cy="558717"/>
+            </a:xfrm>
+            <a:prstGeom prst="roundRect">
+              <a:avLst/>
+            </a:prstGeom>
+          </p:spPr>
+          <p:style>
+            <a:lnRef idx="2">
+              <a:schemeClr val="dk1"/>
+            </a:lnRef>
+            <a:fillRef idx="1">
+              <a:schemeClr val="lt1"/>
+            </a:fillRef>
+            <a:effectRef idx="0">
+              <a:schemeClr val="dk1"/>
+            </a:effectRef>
+            <a:fontRef idx="minor">
+              <a:schemeClr val="dk1"/>
+            </a:fontRef>
+          </p:style>
+          <p:txBody>
+            <a:bodyPr rtlCol="0" anchor="ctr"/>
+            <a:lstStyle/>
+            <a:p>
+              <a:pPr algn="ctr"/>
+              <a:r>
+                <a:rPr lang="en-US" dirty="0" smtClean="0"/>
+                <a:t>Image for the </a:t>
+              </a:r>
+            </a:p>
+            <a:p>
+              <a:pPr algn="ctr"/>
+              <a:r>
+                <a:rPr lang="en-US" dirty="0" smtClean="0"/>
+                <a:t>right </a:t>
+              </a:r>
+              <a:r>
+                <a:rPr lang="en-US" dirty="0" smtClean="0"/>
+                <a:t>eye</a:t>
+              </a:r>
+              <a:endParaRPr lang="en-US" dirty="0"/>
+            </a:p>
+          </p:txBody>
+        </p:sp>
+        <p:sp>
+          <p:nvSpPr>
+            <p:cNvPr id="34" name="CaixaDeTexto 33"/>
+            <p:cNvSpPr txBox="1"/>
+            <p:nvPr/>
+          </p:nvSpPr>
+          <p:spPr>
+            <a:xfrm>
+              <a:off x="4577396" y="1583025"/>
+              <a:ext cx="2154844" cy="307777"/>
+            </a:xfrm>
+            <a:prstGeom prst="rect">
+              <a:avLst/>
+            </a:prstGeom>
+            <a:noFill/>
+          </p:spPr>
+          <p:txBody>
+            <a:bodyPr wrap="square" rtlCol="0">
+              <a:spAutoFit/>
+            </a:bodyPr>
+            <a:lstStyle/>
+            <a:p>
+              <a:r>
+                <a:rPr lang="en-US" sz="1400" i="1" dirty="0" smtClean="0"/>
+                <a:t>Green-magenta anaglyph</a:t>
+              </a:r>
+              <a:endParaRPr lang="en-US" sz="1400" i="1" dirty="0"/>
+            </a:p>
+          </p:txBody>
+        </p:sp>
+      </p:grpSp>
+    </p:spTree>
+    <p:extLst>
+      <p:ext uri="{BB962C8B-B14F-4D97-AF65-F5344CB8AC3E}">
+        <p14:creationId xmlns:p14="http://schemas.microsoft.com/office/powerpoint/2010/main" val="998924334"/>
+      </p:ext>
+    </p:extLst>
+  </p:cSld>
+  <p:clrMapOvr>
+    <a:masterClrMapping/>
+  </p:clrMapOvr>
+</p:sld>
+</file>
+
 <file path=ppt/slides/slide2.xml><?xml version="1.0" encoding="utf-8"?>
 <p:sld xmlns:a="http://schemas.openxmlformats.org/drawingml/2006/main" xmlns:r="http://schemas.openxmlformats.org/officeDocument/2006/relationships" xmlns:p="http://schemas.openxmlformats.org/presentationml/2006/main">
   <p:cSld>
@@ -7118,7 +9071,7 @@
             </a:r>
             <a:r>
               <a:rPr lang="pt-BR" dirty="0" err="1" smtClean="0"/>
-              <a:t>conversion</a:t>
+              <a:t>creation</a:t>
             </a:r>
             <a:endParaRPr lang="pt-BR" dirty="0"/>
           </a:p>

</xml_diff>

<commit_message>
SAC - artigo com a primeira revisão do professor
Mestrado
- modificações nas imagens utilizadas em artigos/quali
</commit_message>
<xml_diff>
--- a/Imagens/imagens-para-artigos-dissertacao.pptx
+++ b/Imagens/imagens-para-artigos-dissertacao.pptx
@@ -301,7 +301,7 @@
           <a:p>
             <a:fld id="{E14A8D8A-9BF6-4F09-B8D2-3E331CA72F09}" type="datetimeFigureOut">
               <a:rPr lang="pt-BR" smtClean="0"/>
-              <a:t>28/8/2011</a:t>
+              <a:t>6/9/2011</a:t>
             </a:fld>
             <a:endParaRPr lang="pt-BR"/>
           </a:p>
@@ -471,7 +471,7 @@
           <a:p>
             <a:fld id="{E14A8D8A-9BF6-4F09-B8D2-3E331CA72F09}" type="datetimeFigureOut">
               <a:rPr lang="pt-BR" smtClean="0"/>
-              <a:t>28/8/2011</a:t>
+              <a:t>6/9/2011</a:t>
             </a:fld>
             <a:endParaRPr lang="pt-BR"/>
           </a:p>
@@ -651,7 +651,7 @@
           <a:p>
             <a:fld id="{E14A8D8A-9BF6-4F09-B8D2-3E331CA72F09}" type="datetimeFigureOut">
               <a:rPr lang="pt-BR" smtClean="0"/>
-              <a:t>28/8/2011</a:t>
+              <a:t>6/9/2011</a:t>
             </a:fld>
             <a:endParaRPr lang="pt-BR"/>
           </a:p>
@@ -821,7 +821,7 @@
           <a:p>
             <a:fld id="{E14A8D8A-9BF6-4F09-B8D2-3E331CA72F09}" type="datetimeFigureOut">
               <a:rPr lang="pt-BR" smtClean="0"/>
-              <a:t>28/8/2011</a:t>
+              <a:t>6/9/2011</a:t>
             </a:fld>
             <a:endParaRPr lang="pt-BR"/>
           </a:p>
@@ -1067,7 +1067,7 @@
           <a:p>
             <a:fld id="{E14A8D8A-9BF6-4F09-B8D2-3E331CA72F09}" type="datetimeFigureOut">
               <a:rPr lang="pt-BR" smtClean="0"/>
-              <a:t>28/8/2011</a:t>
+              <a:t>6/9/2011</a:t>
             </a:fld>
             <a:endParaRPr lang="pt-BR"/>
           </a:p>
@@ -1355,7 +1355,7 @@
           <a:p>
             <a:fld id="{E14A8D8A-9BF6-4F09-B8D2-3E331CA72F09}" type="datetimeFigureOut">
               <a:rPr lang="pt-BR" smtClean="0"/>
-              <a:t>28/8/2011</a:t>
+              <a:t>6/9/2011</a:t>
             </a:fld>
             <a:endParaRPr lang="pt-BR"/>
           </a:p>
@@ -1777,7 +1777,7 @@
           <a:p>
             <a:fld id="{E14A8D8A-9BF6-4F09-B8D2-3E331CA72F09}" type="datetimeFigureOut">
               <a:rPr lang="pt-BR" smtClean="0"/>
-              <a:t>28/8/2011</a:t>
+              <a:t>6/9/2011</a:t>
             </a:fld>
             <a:endParaRPr lang="pt-BR"/>
           </a:p>
@@ -1895,7 +1895,7 @@
           <a:p>
             <a:fld id="{E14A8D8A-9BF6-4F09-B8D2-3E331CA72F09}" type="datetimeFigureOut">
               <a:rPr lang="pt-BR" smtClean="0"/>
-              <a:t>28/8/2011</a:t>
+              <a:t>6/9/2011</a:t>
             </a:fld>
             <a:endParaRPr lang="pt-BR"/>
           </a:p>
@@ -1990,7 +1990,7 @@
           <a:p>
             <a:fld id="{E14A8D8A-9BF6-4F09-B8D2-3E331CA72F09}" type="datetimeFigureOut">
               <a:rPr lang="pt-BR" smtClean="0"/>
-              <a:t>28/8/2011</a:t>
+              <a:t>6/9/2011</a:t>
             </a:fld>
             <a:endParaRPr lang="pt-BR"/>
           </a:p>
@@ -2267,7 +2267,7 @@
           <a:p>
             <a:fld id="{E14A8D8A-9BF6-4F09-B8D2-3E331CA72F09}" type="datetimeFigureOut">
               <a:rPr lang="pt-BR" smtClean="0"/>
-              <a:t>28/8/2011</a:t>
+              <a:t>6/9/2011</a:t>
             </a:fld>
             <a:endParaRPr lang="pt-BR"/>
           </a:p>
@@ -2520,7 +2520,7 @@
           <a:p>
             <a:fld id="{E14A8D8A-9BF6-4F09-B8D2-3E331CA72F09}" type="datetimeFigureOut">
               <a:rPr lang="pt-BR" smtClean="0"/>
-              <a:t>28/8/2011</a:t>
+              <a:t>6/9/2011</a:t>
             </a:fld>
             <a:endParaRPr lang="pt-BR"/>
           </a:p>
@@ -2733,7 +2733,7 @@
           <a:p>
             <a:fld id="{E14A8D8A-9BF6-4F09-B8D2-3E331CA72F09}" type="datetimeFigureOut">
               <a:rPr lang="pt-BR" smtClean="0"/>
-              <a:t>28/8/2011</a:t>
+              <a:t>6/9/2011</a:t>
             </a:fld>
             <a:endParaRPr lang="pt-BR"/>
           </a:p>
@@ -4961,23 +4961,24 @@
         <p:grpSpPr>
           <a:xfrm>
             <a:off x="755576" y="1268760"/>
-            <a:ext cx="6408712" cy="5832648"/>
+            <a:ext cx="6480720" cy="7848872"/>
             <a:chOff x="1547664" y="44624"/>
-            <a:chExt cx="6408712" cy="5832648"/>
+            <a:chExt cx="6480720" cy="7848872"/>
           </a:xfrm>
         </p:grpSpPr>
         <p:cxnSp>
           <p:nvCxnSpPr>
             <p:cNvPr id="5" name="Conector angulado 4"/>
             <p:cNvCxnSpPr>
+              <a:stCxn id="7" idx="2"/>
               <a:endCxn id="26" idx="1"/>
             </p:cNvCxnSpPr>
             <p:nvPr/>
           </p:nvCxnSpPr>
           <p:spPr>
             <a:xfrm rot="16200000" flipH="1">
-              <a:off x="1680280" y="3040215"/>
-              <a:ext cx="2916324" cy="301237"/>
+              <a:off x="1101616" y="4595128"/>
+              <a:ext cx="4060447" cy="288030"/>
             </a:xfrm>
             <a:prstGeom prst="bentConnector2">
               <a:avLst/>
@@ -5005,14 +5006,15 @@
           <p:nvCxnSpPr>
             <p:cNvPr id="6" name="Conector angulado 5"/>
             <p:cNvCxnSpPr>
+              <a:stCxn id="8" idx="2"/>
               <a:endCxn id="26" idx="3"/>
             </p:cNvCxnSpPr>
             <p:nvPr/>
           </p:nvCxnSpPr>
           <p:spPr>
             <a:xfrm rot="5400000">
-              <a:off x="4524597" y="3089425"/>
-              <a:ext cx="2916324" cy="202819"/>
+              <a:off x="3945932" y="4631130"/>
+              <a:ext cx="4060447" cy="216026"/>
             </a:xfrm>
             <a:prstGeom prst="bentConnector2">
               <a:avLst/>
@@ -5072,9 +5074,29 @@
               <a:pPr algn="ctr"/>
               <a:r>
                 <a:rPr lang="en-US" dirty="0" smtClean="0"/>
-                <a:t>Green-magenta anaglyph</a:t>
-              </a:r>
-              <a:endParaRPr lang="en-US" dirty="0"/>
+                <a:t>R</a:t>
+              </a:r>
+              <a:r>
+                <a:rPr lang="en-US" baseline="-25000" dirty="0" smtClean="0"/>
+                <a:t>2</a:t>
+              </a:r>
+              <a:r>
+                <a:rPr lang="en-US" dirty="0" smtClean="0"/>
+                <a:t>G</a:t>
+              </a:r>
+              <a:r>
+                <a:rPr lang="en-US" baseline="-25000" dirty="0" smtClean="0"/>
+                <a:t>1</a:t>
+              </a:r>
+              <a:r>
+                <a:rPr lang="en-US" dirty="0" smtClean="0"/>
+                <a:t>B</a:t>
+              </a:r>
+              <a:r>
+                <a:rPr lang="en-US" baseline="-25000" dirty="0" smtClean="0"/>
+                <a:t>2</a:t>
+              </a:r>
+              <a:endParaRPr lang="en-US" baseline="-25000" dirty="0"/>
             </a:p>
           </p:txBody>
         </p:sp>
@@ -5114,9 +5136,29 @@
               <a:pPr algn="ctr"/>
               <a:r>
                 <a:rPr lang="en-US" dirty="0" smtClean="0"/>
-                <a:t>Complementary Anaglyph</a:t>
-              </a:r>
-              <a:endParaRPr lang="en-US" dirty="0"/>
+                <a:t>R</a:t>
+              </a:r>
+              <a:r>
+                <a:rPr lang="en-US" baseline="-25000" dirty="0" smtClean="0"/>
+                <a:t>1</a:t>
+              </a:r>
+              <a:r>
+                <a:rPr lang="en-US" dirty="0" smtClean="0"/>
+                <a:t>G</a:t>
+              </a:r>
+              <a:r>
+                <a:rPr lang="en-US" baseline="-25000" dirty="0" smtClean="0"/>
+                <a:t>2</a:t>
+              </a:r>
+              <a:r>
+                <a:rPr lang="en-US" dirty="0" smtClean="0"/>
+                <a:t>B</a:t>
+              </a:r>
+              <a:r>
+                <a:rPr lang="en-US" baseline="-25000" dirty="0" smtClean="0"/>
+                <a:t>1</a:t>
+              </a:r>
+              <a:endParaRPr lang="en-US" baseline="-25000" dirty="0"/>
             </a:p>
           </p:txBody>
         </p:sp>
@@ -5156,16 +5198,29 @@
               <a:pPr algn="ctr"/>
               <a:r>
                 <a:rPr lang="en-US" dirty="0" smtClean="0"/>
-                <a:t>Image for the </a:t>
-              </a:r>
-            </a:p>
-            <a:p>
-              <a:pPr algn="ctr"/>
+                <a:t>R</a:t>
+              </a:r>
+              <a:r>
+                <a:rPr lang="en-US" baseline="-25000" dirty="0" smtClean="0"/>
+                <a:t>2</a:t>
+              </a:r>
               <a:r>
                 <a:rPr lang="en-US" dirty="0" smtClean="0"/>
-                <a:t>left eye</a:t>
-              </a:r>
-              <a:endParaRPr lang="en-US" dirty="0"/>
+                <a:t>G</a:t>
+              </a:r>
+              <a:r>
+                <a:rPr lang="en-US" baseline="-25000" dirty="0" smtClean="0"/>
+                <a:t>2</a:t>
+              </a:r>
+              <a:r>
+                <a:rPr lang="en-US" dirty="0" smtClean="0"/>
+                <a:t>B</a:t>
+              </a:r>
+              <a:r>
+                <a:rPr lang="en-US" baseline="-25000" dirty="0" smtClean="0"/>
+                <a:t>2</a:t>
+              </a:r>
+              <a:endParaRPr lang="en-US" baseline="-25000" dirty="0"/>
             </a:p>
           </p:txBody>
         </p:sp>
@@ -5204,10 +5259,29 @@
             <a:p>
               <a:pPr algn="ctr"/>
               <a:r>
-                <a:rPr lang="en-US" smtClean="0"/>
-                <a:t>Image for the right eye</a:t>
-              </a:r>
-              <a:endParaRPr lang="en-US"/>
+                <a:rPr lang="en-US" dirty="0"/>
+                <a:t>R</a:t>
+              </a:r>
+              <a:r>
+                <a:rPr lang="en-US" baseline="-25000" dirty="0"/>
+                <a:t>2</a:t>
+              </a:r>
+              <a:r>
+                <a:rPr lang="en-US" dirty="0"/>
+                <a:t>G</a:t>
+              </a:r>
+              <a:r>
+                <a:rPr lang="en-US" baseline="-25000" dirty="0"/>
+                <a:t>2</a:t>
+              </a:r>
+              <a:r>
+                <a:rPr lang="en-US" dirty="0"/>
+                <a:t>B</a:t>
+              </a:r>
+              <a:r>
+                <a:rPr lang="en-US" baseline="-25000" dirty="0"/>
+                <a:t>2</a:t>
+              </a:r>
             </a:p>
           </p:txBody>
         </p:sp>
@@ -5225,32 +5299,20 @@
             <a:prstGeom prst="rect">
               <a:avLst/>
             </a:prstGeom>
-            <a:solidFill>
-              <a:schemeClr val="accent1">
-                <a:lumMod val="60000"/>
-                <a:lumOff val="40000"/>
-              </a:schemeClr>
-            </a:solidFill>
-            <a:ln>
-              <a:solidFill>
-                <a:schemeClr val="accent1"/>
-              </a:solidFill>
-            </a:ln>
+            <a:ln/>
           </p:spPr>
           <p:style>
-            <a:lnRef idx="2">
-              <a:schemeClr val="accent5">
-                <a:shade val="50000"/>
-              </a:schemeClr>
+            <a:lnRef idx="1">
+              <a:schemeClr val="accent1"/>
             </a:lnRef>
-            <a:fillRef idx="1">
-              <a:schemeClr val="accent5"/>
+            <a:fillRef idx="2">
+              <a:schemeClr val="accent1"/>
             </a:fillRef>
-            <a:effectRef idx="0">
-              <a:schemeClr val="accent5"/>
+            <a:effectRef idx="1">
+              <a:schemeClr val="accent1"/>
             </a:effectRef>
             <a:fontRef idx="minor">
-              <a:schemeClr val="lt1"/>
+              <a:schemeClr val="dk1"/>
             </a:fontRef>
           </p:style>
           <p:txBody>
@@ -5280,32 +5342,20 @@
             <a:prstGeom prst="rect">
               <a:avLst/>
             </a:prstGeom>
-            <a:solidFill>
-              <a:schemeClr val="accent1">
-                <a:lumMod val="60000"/>
-                <a:lumOff val="40000"/>
-              </a:schemeClr>
-            </a:solidFill>
-            <a:ln>
-              <a:solidFill>
-                <a:schemeClr val="accent1"/>
-              </a:solidFill>
-            </a:ln>
+            <a:ln/>
           </p:spPr>
           <p:style>
-            <a:lnRef idx="2">
-              <a:schemeClr val="accent5">
-                <a:shade val="50000"/>
-              </a:schemeClr>
+            <a:lnRef idx="1">
+              <a:schemeClr val="accent1"/>
             </a:lnRef>
-            <a:fillRef idx="1">
-              <a:schemeClr val="accent5"/>
+            <a:fillRef idx="2">
+              <a:schemeClr val="accent1"/>
             </a:fillRef>
-            <a:effectRef idx="0">
-              <a:schemeClr val="accent5"/>
+            <a:effectRef idx="1">
+              <a:schemeClr val="accent1"/>
             </a:effectRef>
             <a:fontRef idx="minor">
-              <a:schemeClr val="lt1"/>
+              <a:schemeClr val="dk1"/>
             </a:fontRef>
           </p:style>
           <p:txBody>
@@ -5347,32 +5397,20 @@
             <a:prstGeom prst="rect">
               <a:avLst/>
             </a:prstGeom>
-            <a:solidFill>
-              <a:schemeClr val="accent1">
-                <a:lumMod val="60000"/>
-                <a:lumOff val="40000"/>
-              </a:schemeClr>
-            </a:solidFill>
-            <a:ln>
-              <a:solidFill>
-                <a:schemeClr val="accent1"/>
-              </a:solidFill>
-            </a:ln>
+            <a:ln/>
           </p:spPr>
           <p:style>
-            <a:lnRef idx="2">
-              <a:schemeClr val="accent5">
-                <a:shade val="50000"/>
-              </a:schemeClr>
+            <a:lnRef idx="1">
+              <a:schemeClr val="accent1"/>
             </a:lnRef>
-            <a:fillRef idx="1">
-              <a:schemeClr val="accent5"/>
+            <a:fillRef idx="2">
+              <a:schemeClr val="accent1"/>
             </a:fillRef>
-            <a:effectRef idx="0">
-              <a:schemeClr val="accent5"/>
+            <a:effectRef idx="1">
+              <a:schemeClr val="accent1"/>
             </a:effectRef>
             <a:fontRef idx="minor">
-              <a:schemeClr val="lt1"/>
+              <a:schemeClr val="dk1"/>
             </a:fontRef>
           </p:style>
           <p:txBody>
@@ -5408,38 +5446,26 @@
           </p:nvSpPr>
           <p:spPr>
             <a:xfrm>
-              <a:off x="1691680" y="3502821"/>
+              <a:off x="1691680" y="4293096"/>
               <a:ext cx="2592288" cy="360040"/>
             </a:xfrm>
             <a:prstGeom prst="rect">
               <a:avLst/>
             </a:prstGeom>
-            <a:solidFill>
-              <a:schemeClr val="accent1">
-                <a:lumMod val="60000"/>
-                <a:lumOff val="40000"/>
-              </a:schemeClr>
-            </a:solidFill>
-            <a:ln>
-              <a:solidFill>
-                <a:schemeClr val="accent1"/>
-              </a:solidFill>
-            </a:ln>
+            <a:ln/>
           </p:spPr>
           <p:style>
-            <a:lnRef idx="2">
-              <a:schemeClr val="accent5">
-                <a:shade val="50000"/>
-              </a:schemeClr>
+            <a:lnRef idx="1">
+              <a:schemeClr val="accent1"/>
             </a:lnRef>
-            <a:fillRef idx="1">
-              <a:schemeClr val="accent5"/>
+            <a:fillRef idx="2">
+              <a:schemeClr val="accent1"/>
             </a:fillRef>
-            <a:effectRef idx="0">
-              <a:schemeClr val="accent5"/>
+            <a:effectRef idx="1">
+              <a:schemeClr val="accent1"/>
             </a:effectRef>
             <a:fontRef idx="minor">
-              <a:schemeClr val="lt1"/>
+              <a:schemeClr val="dk1"/>
             </a:fontRef>
           </p:style>
           <p:txBody>
@@ -5463,38 +5489,26 @@
           </p:nvSpPr>
           <p:spPr>
             <a:xfrm>
-              <a:off x="4788024" y="3502821"/>
+              <a:off x="4788024" y="4293096"/>
               <a:ext cx="2592288" cy="360040"/>
             </a:xfrm>
             <a:prstGeom prst="rect">
               <a:avLst/>
             </a:prstGeom>
-            <a:solidFill>
-              <a:schemeClr val="accent1">
-                <a:lumMod val="60000"/>
-                <a:lumOff val="40000"/>
-              </a:schemeClr>
-            </a:solidFill>
-            <a:ln>
-              <a:solidFill>
-                <a:schemeClr val="accent1"/>
-              </a:solidFill>
-            </a:ln>
+            <a:ln/>
           </p:spPr>
           <p:style>
-            <a:lnRef idx="2">
-              <a:schemeClr val="accent5">
-                <a:shade val="50000"/>
-              </a:schemeClr>
+            <a:lnRef idx="1">
+              <a:schemeClr val="accent1"/>
             </a:lnRef>
-            <a:fillRef idx="1">
-              <a:schemeClr val="accent5"/>
+            <a:fillRef idx="2">
+              <a:schemeClr val="accent1"/>
             </a:fillRef>
-            <a:effectRef idx="0">
-              <a:schemeClr val="accent5"/>
+            <a:effectRef idx="1">
+              <a:schemeClr val="accent1"/>
             </a:effectRef>
             <a:fontRef idx="minor">
-              <a:schemeClr val="lt1"/>
+              <a:schemeClr val="dk1"/>
             </a:fontRef>
           </p:style>
           <p:txBody>
@@ -5517,38 +5531,26 @@
           </p:nvSpPr>
           <p:spPr>
             <a:xfrm>
-              <a:off x="4787668" y="4005064"/>
+              <a:off x="4787668" y="5445224"/>
               <a:ext cx="2592288" cy="360040"/>
             </a:xfrm>
             <a:prstGeom prst="rect">
               <a:avLst/>
             </a:prstGeom>
-            <a:solidFill>
-              <a:schemeClr val="accent1">
-                <a:lumMod val="60000"/>
-                <a:lumOff val="40000"/>
-              </a:schemeClr>
-            </a:solidFill>
-            <a:ln>
-              <a:solidFill>
-                <a:schemeClr val="accent1"/>
-              </a:solidFill>
-            </a:ln>
+            <a:ln/>
           </p:spPr>
           <p:style>
-            <a:lnRef idx="2">
-              <a:schemeClr val="accent5">
-                <a:shade val="50000"/>
-              </a:schemeClr>
+            <a:lnRef idx="1">
+              <a:schemeClr val="accent1"/>
             </a:lnRef>
-            <a:fillRef idx="1">
-              <a:schemeClr val="accent5"/>
+            <a:fillRef idx="2">
+              <a:schemeClr val="accent1"/>
             </a:fillRef>
-            <a:effectRef idx="0">
-              <a:schemeClr val="accent5"/>
+            <a:effectRef idx="1">
+              <a:schemeClr val="accent1"/>
             </a:effectRef>
             <a:fontRef idx="minor">
-              <a:schemeClr val="lt1"/>
+              <a:schemeClr val="dk1"/>
             </a:fontRef>
           </p:style>
           <p:txBody>
@@ -5572,7 +5574,7 @@
           </p:nvSpPr>
           <p:spPr>
             <a:xfrm>
-              <a:off x="3649101" y="5157192"/>
+              <a:off x="3635894" y="7173416"/>
               <a:ext cx="1872208" cy="720080"/>
             </a:xfrm>
             <a:prstGeom prst="roundRect">
@@ -5746,38 +5748,26 @@
           </p:nvSpPr>
           <p:spPr>
             <a:xfrm>
-              <a:off x="3289061" y="4468976"/>
+              <a:off x="3275854" y="6589347"/>
               <a:ext cx="2592288" cy="360040"/>
             </a:xfrm>
             <a:prstGeom prst="rect">
               <a:avLst/>
             </a:prstGeom>
-            <a:solidFill>
-              <a:schemeClr val="accent1">
-                <a:lumMod val="60000"/>
-                <a:lumOff val="40000"/>
-              </a:schemeClr>
-            </a:solidFill>
-            <a:ln>
-              <a:solidFill>
-                <a:schemeClr val="accent1"/>
-              </a:solidFill>
-            </a:ln>
+            <a:ln/>
           </p:spPr>
           <p:style>
-            <a:lnRef idx="2">
-              <a:schemeClr val="accent5">
-                <a:shade val="50000"/>
-              </a:schemeClr>
+            <a:lnRef idx="1">
+              <a:schemeClr val="accent1"/>
             </a:lnRef>
-            <a:fillRef idx="1">
-              <a:schemeClr val="accent5"/>
+            <a:fillRef idx="2">
+              <a:schemeClr val="accent1"/>
             </a:fillRef>
-            <a:effectRef idx="0">
-              <a:schemeClr val="accent5"/>
+            <a:effectRef idx="1">
+              <a:schemeClr val="accent1"/>
             </a:effectRef>
             <a:fontRef idx="minor">
-              <a:schemeClr val="lt1"/>
+              <a:schemeClr val="dk1"/>
             </a:fontRef>
           </p:style>
           <p:txBody>
@@ -5798,13 +5788,14 @@
             <p:cNvPr id="27" name="Conector de seta reta 26"/>
             <p:cNvCxnSpPr>
               <a:stCxn id="26" idx="2"/>
+              <a:endCxn id="17" idx="0"/>
             </p:cNvCxnSpPr>
             <p:nvPr/>
           </p:nvCxnSpPr>
           <p:spPr>
             <a:xfrm>
-              <a:off x="4585205" y="4829016"/>
-              <a:ext cx="0" cy="328176"/>
+              <a:off x="4571998" y="6949387"/>
+              <a:ext cx="0" cy="224029"/>
             </a:xfrm>
             <a:prstGeom prst="straightConnector1">
               <a:avLst/>
@@ -5836,8 +5827,8 @@
           </p:nvSpPr>
           <p:spPr>
             <a:xfrm>
-              <a:off x="1547664" y="2996953"/>
-              <a:ext cx="5976664" cy="932802"/>
+              <a:off x="1547664" y="2996952"/>
+              <a:ext cx="5976664" cy="1728191"/>
             </a:xfrm>
             <a:prstGeom prst="rect">
               <a:avLst/>
@@ -5968,7 +5959,7 @@
           </p:nvSpPr>
           <p:spPr>
             <a:xfrm>
-              <a:off x="7452320" y="4015807"/>
+              <a:off x="7524328" y="5455967"/>
               <a:ext cx="504056" cy="338554"/>
             </a:xfrm>
             <a:prstGeom prst="rect">
@@ -5991,6 +5982,312 @@
           </p:txBody>
         </p:sp>
       </p:grpSp>
+      <p:sp>
+        <p:nvSpPr>
+          <p:cNvPr id="28" name="Retângulo de cantos arredondados 27"/>
+          <p:cNvSpPr/>
+          <p:nvPr/>
+        </p:nvSpPr>
+        <p:spPr>
+          <a:xfrm>
+            <a:off x="1547664" y="4824226"/>
+            <a:ext cx="1296142" cy="521916"/>
+          </a:xfrm>
+          <a:prstGeom prst="roundRect">
+            <a:avLst/>
+          </a:prstGeom>
+        </p:spPr>
+        <p:style>
+          <a:lnRef idx="2">
+            <a:schemeClr val="dk1"/>
+          </a:lnRef>
+          <a:fillRef idx="1">
+            <a:schemeClr val="lt1"/>
+          </a:fillRef>
+          <a:effectRef idx="0">
+            <a:schemeClr val="dk1"/>
+          </a:effectRef>
+          <a:fontRef idx="minor">
+            <a:schemeClr val="dk1"/>
+          </a:fontRef>
+        </p:style>
+        <p:txBody>
+          <a:bodyPr rtlCol="0" anchor="ctr"/>
+          <a:lstStyle/>
+          <a:p>
+            <a:pPr algn="ctr"/>
+            <a:r>
+              <a:rPr lang="en-US" dirty="0" smtClean="0"/>
+              <a:t>Y </a:t>
+            </a:r>
+            <a:r>
+              <a:rPr lang="en-US" dirty="0" err="1" smtClean="0"/>
+              <a:t>C</a:t>
+            </a:r>
+            <a:r>
+              <a:rPr lang="en-US" baseline="-25000" dirty="0" err="1" smtClean="0"/>
+              <a:t>b</a:t>
+            </a:r>
+            <a:r>
+              <a:rPr lang="en-US" baseline="-25000" dirty="0" smtClean="0"/>
+              <a:t> </a:t>
+            </a:r>
+            <a:r>
+              <a:rPr lang="en-US" dirty="0" smtClean="0"/>
+              <a:t>C</a:t>
+            </a:r>
+            <a:r>
+              <a:rPr lang="en-US" baseline="-25000" dirty="0" smtClean="0"/>
+              <a:t>r</a:t>
+            </a:r>
+            <a:endParaRPr lang="en-US" baseline="-25000" dirty="0"/>
+          </a:p>
+        </p:txBody>
+      </p:sp>
+      <p:sp>
+        <p:nvSpPr>
+          <p:cNvPr id="29" name="Retângulo de cantos arredondados 28"/>
+          <p:cNvSpPr/>
+          <p:nvPr/>
+        </p:nvSpPr>
+        <p:spPr>
+          <a:xfrm>
+            <a:off x="4643653" y="4824226"/>
+            <a:ext cx="1296142" cy="521916"/>
+          </a:xfrm>
+          <a:prstGeom prst="roundRect">
+            <a:avLst/>
+          </a:prstGeom>
+        </p:spPr>
+        <p:style>
+          <a:lnRef idx="2">
+            <a:schemeClr val="dk1"/>
+          </a:lnRef>
+          <a:fillRef idx="1">
+            <a:schemeClr val="lt1"/>
+          </a:fillRef>
+          <a:effectRef idx="0">
+            <a:schemeClr val="dk1"/>
+          </a:effectRef>
+          <a:fontRef idx="minor">
+            <a:schemeClr val="dk1"/>
+          </a:fontRef>
+        </p:style>
+        <p:txBody>
+          <a:bodyPr rtlCol="0" anchor="ctr"/>
+          <a:lstStyle/>
+          <a:p>
+            <a:pPr algn="ctr"/>
+            <a:r>
+              <a:rPr lang="en-US" dirty="0" smtClean="0"/>
+              <a:t>Y’ </a:t>
+            </a:r>
+            <a:r>
+              <a:rPr lang="en-US" dirty="0" err="1" smtClean="0"/>
+              <a:t>C</a:t>
+            </a:r>
+            <a:r>
+              <a:rPr lang="en-US" baseline="-25000" dirty="0" err="1" smtClean="0"/>
+              <a:t>b</a:t>
+            </a:r>
+            <a:r>
+              <a:rPr lang="en-US" dirty="0" smtClean="0"/>
+              <a:t>’</a:t>
+            </a:r>
+            <a:r>
+              <a:rPr lang="en-US" baseline="-25000" dirty="0" smtClean="0"/>
+              <a:t> </a:t>
+            </a:r>
+            <a:r>
+              <a:rPr lang="en-US" dirty="0" smtClean="0"/>
+              <a:t>C</a:t>
+            </a:r>
+            <a:r>
+              <a:rPr lang="en-US" baseline="-25000" dirty="0" smtClean="0"/>
+              <a:t>r</a:t>
+            </a:r>
+            <a:r>
+              <a:rPr lang="en-US" dirty="0" smtClean="0"/>
+              <a:t>’</a:t>
+            </a:r>
+            <a:endParaRPr lang="en-US" dirty="0"/>
+          </a:p>
+        </p:txBody>
+      </p:sp>
+      <p:sp>
+        <p:nvSpPr>
+          <p:cNvPr id="32" name="Retângulo de cantos arredondados 31"/>
+          <p:cNvSpPr/>
+          <p:nvPr/>
+        </p:nvSpPr>
+        <p:spPr>
+          <a:xfrm>
+            <a:off x="1547664" y="6019475"/>
+            <a:ext cx="1296142" cy="521916"/>
+          </a:xfrm>
+          <a:prstGeom prst="roundRect">
+            <a:avLst/>
+          </a:prstGeom>
+        </p:spPr>
+        <p:style>
+          <a:lnRef idx="2">
+            <a:schemeClr val="dk1"/>
+          </a:lnRef>
+          <a:fillRef idx="1">
+            <a:schemeClr val="lt1"/>
+          </a:fillRef>
+          <a:effectRef idx="0">
+            <a:schemeClr val="dk1"/>
+          </a:effectRef>
+          <a:fontRef idx="minor">
+            <a:schemeClr val="dk1"/>
+          </a:fontRef>
+        </p:style>
+        <p:txBody>
+          <a:bodyPr rtlCol="0" anchor="ctr"/>
+          <a:lstStyle/>
+          <a:p>
+            <a:pPr algn="ctr"/>
+            <a:r>
+              <a:rPr lang="en-US" sz="1600" dirty="0" smtClean="0"/>
+              <a:t>Subsampled Y </a:t>
+            </a:r>
+            <a:r>
+              <a:rPr lang="en-US" sz="1600" dirty="0" err="1" smtClean="0"/>
+              <a:t>C</a:t>
+            </a:r>
+            <a:r>
+              <a:rPr lang="en-US" sz="1600" baseline="-25000" dirty="0" err="1" smtClean="0"/>
+              <a:t>b</a:t>
+            </a:r>
+            <a:r>
+              <a:rPr lang="en-US" sz="1600" baseline="-25000" dirty="0" smtClean="0"/>
+              <a:t> </a:t>
+            </a:r>
+            <a:r>
+              <a:rPr lang="en-US" sz="1600" dirty="0" smtClean="0"/>
+              <a:t>C</a:t>
+            </a:r>
+            <a:r>
+              <a:rPr lang="en-US" sz="1600" baseline="-25000" dirty="0" smtClean="0"/>
+              <a:t>r</a:t>
+            </a:r>
+            <a:endParaRPr lang="en-US" sz="1600" baseline="-25000" dirty="0"/>
+          </a:p>
+        </p:txBody>
+      </p:sp>
+      <p:sp>
+        <p:nvSpPr>
+          <p:cNvPr id="36" name="Retângulo de cantos arredondados 35"/>
+          <p:cNvSpPr/>
+          <p:nvPr/>
+        </p:nvSpPr>
+        <p:spPr>
+          <a:xfrm>
+            <a:off x="4643653" y="7173416"/>
+            <a:ext cx="1296142" cy="521916"/>
+          </a:xfrm>
+          <a:prstGeom prst="roundRect">
+            <a:avLst/>
+          </a:prstGeom>
+        </p:spPr>
+        <p:style>
+          <a:lnRef idx="2">
+            <a:schemeClr val="dk1"/>
+          </a:lnRef>
+          <a:fillRef idx="1">
+            <a:schemeClr val="lt1"/>
+          </a:fillRef>
+          <a:effectRef idx="0">
+            <a:schemeClr val="dk1"/>
+          </a:effectRef>
+          <a:fontRef idx="minor">
+            <a:schemeClr val="dk1"/>
+          </a:fontRef>
+        </p:style>
+        <p:txBody>
+          <a:bodyPr rtlCol="0" anchor="ctr"/>
+          <a:lstStyle/>
+          <a:p>
+            <a:pPr algn="ctr"/>
+            <a:r>
+              <a:rPr lang="en-US" sz="1600" dirty="0" smtClean="0"/>
+              <a:t>Color Index Table</a:t>
+            </a:r>
+            <a:endParaRPr lang="en-US" sz="1600" dirty="0"/>
+          </a:p>
+        </p:txBody>
+      </p:sp>
+      <p:sp>
+        <p:nvSpPr>
+          <p:cNvPr id="37" name="Retângulo de cantos arredondados 36"/>
+          <p:cNvSpPr/>
+          <p:nvPr/>
+        </p:nvSpPr>
+        <p:spPr>
+          <a:xfrm>
+            <a:off x="4644010" y="6019475"/>
+            <a:ext cx="1296142" cy="521916"/>
+          </a:xfrm>
+          <a:prstGeom prst="roundRect">
+            <a:avLst/>
+          </a:prstGeom>
+        </p:spPr>
+        <p:style>
+          <a:lnRef idx="2">
+            <a:schemeClr val="dk1"/>
+          </a:lnRef>
+          <a:fillRef idx="1">
+            <a:schemeClr val="lt1"/>
+          </a:fillRef>
+          <a:effectRef idx="0">
+            <a:schemeClr val="dk1"/>
+          </a:effectRef>
+          <a:fontRef idx="minor">
+            <a:schemeClr val="dk1"/>
+          </a:fontRef>
+        </p:style>
+        <p:txBody>
+          <a:bodyPr rtlCol="0" anchor="ctr"/>
+          <a:lstStyle/>
+          <a:p>
+            <a:pPr algn="ctr"/>
+            <a:r>
+              <a:rPr lang="en-US" sz="1600" dirty="0" smtClean="0"/>
+              <a:t>Subsampled Y’ </a:t>
+            </a:r>
+            <a:r>
+              <a:rPr lang="en-US" sz="1600" dirty="0" err="1" smtClean="0"/>
+              <a:t>C</a:t>
+            </a:r>
+            <a:r>
+              <a:rPr lang="en-US" sz="1600" baseline="-25000" dirty="0" err="1" smtClean="0"/>
+              <a:t>b</a:t>
+            </a:r>
+            <a:r>
+              <a:rPr lang="en-US" sz="1600" dirty="0" smtClean="0"/>
+              <a:t>’</a:t>
+            </a:r>
+            <a:r>
+              <a:rPr lang="en-US" sz="1600" baseline="-25000" dirty="0" smtClean="0"/>
+              <a:t> </a:t>
+            </a:r>
+            <a:r>
+              <a:rPr lang="en-US" sz="1600" dirty="0" smtClean="0"/>
+              <a:t>C</a:t>
+            </a:r>
+            <a:r>
+              <a:rPr lang="en-US" sz="1600" baseline="-25000" dirty="0" smtClean="0"/>
+              <a:t>r</a:t>
+            </a:r>
+            <a:r>
+              <a:rPr lang="en-US" sz="1600" dirty="0" smtClean="0"/>
+              <a:t>’</a:t>
+            </a:r>
+            <a:endParaRPr lang="en-US" sz="1600" dirty="0"/>
+          </a:p>
+        </p:txBody>
+      </p:sp>
     </p:spTree>
     <p:extLst>
       <p:ext uri="{BB962C8B-B14F-4D97-AF65-F5344CB8AC3E}">
@@ -6068,24 +6365,25 @@
         </p:nvGrpSpPr>
         <p:grpSpPr>
           <a:xfrm>
-            <a:off x="2425475" y="1583025"/>
-            <a:ext cx="4882829" cy="4420916"/>
-            <a:chOff x="2425475" y="1583025"/>
-            <a:chExt cx="4882829" cy="4420916"/>
+            <a:off x="2308737" y="1583025"/>
+            <a:ext cx="4882829" cy="5540478"/>
+            <a:chOff x="2463440" y="1583025"/>
+            <a:chExt cx="4882829" cy="5540478"/>
           </a:xfrm>
         </p:grpSpPr>
         <p:cxnSp>
           <p:nvCxnSpPr>
             <p:cNvPr id="5" name="Conector angulado 4"/>
             <p:cNvCxnSpPr>
+              <a:stCxn id="29" idx="2"/>
               <a:endCxn id="9" idx="3"/>
             </p:cNvCxnSpPr>
             <p:nvPr/>
           </p:nvCxnSpPr>
           <p:spPr>
             <a:xfrm rot="5400000">
-              <a:off x="2997088" y="4443098"/>
-              <a:ext cx="2296463" cy="266507"/>
+              <a:off x="2598480" y="5168582"/>
+              <a:ext cx="3127114" cy="224013"/>
             </a:xfrm>
             <a:prstGeom prst="bentConnector2">
               <a:avLst/>
@@ -6113,14 +6411,15 @@
           <p:nvCxnSpPr>
             <p:cNvPr id="6" name="Conector angulado 5"/>
             <p:cNvCxnSpPr>
+              <a:stCxn id="10" idx="2"/>
               <a:endCxn id="33" idx="1"/>
             </p:cNvCxnSpPr>
             <p:nvPr/>
           </p:nvCxnSpPr>
           <p:spPr>
             <a:xfrm rot="16200000" flipH="1">
-              <a:off x="3835760" y="3838629"/>
-              <a:ext cx="3486290" cy="285618"/>
+              <a:off x="3471307" y="4555772"/>
+              <a:ext cx="4351249" cy="225496"/>
             </a:xfrm>
             <a:prstGeom prst="bentConnector2">
               <a:avLst/>
@@ -6179,34 +6478,34 @@
             <a:p>
               <a:pPr algn="ctr"/>
               <a:r>
-                <a:rPr lang="en-US" dirty="0" err="1" smtClean="0"/>
+                <a:rPr lang="en-US" sz="1600" dirty="0" err="1" smtClean="0"/>
                 <a:t>C</a:t>
               </a:r>
               <a:r>
-                <a:rPr lang="en-US" baseline="-25000" dirty="0" err="1" smtClean="0"/>
+                <a:rPr lang="en-US" sz="1600" baseline="-25000" dirty="0" err="1" smtClean="0"/>
                 <a:t>b</a:t>
               </a:r>
               <a:r>
-                <a:rPr lang="en-US" dirty="0" smtClean="0"/>
+                <a:rPr lang="en-US" sz="1600" dirty="0" smtClean="0"/>
                 <a:t>’</a:t>
               </a:r>
               <a:r>
-                <a:rPr lang="en-US" baseline="-25000" dirty="0" smtClean="0"/>
+                <a:rPr lang="en-US" sz="1600" baseline="-25000" dirty="0" smtClean="0"/>
                 <a:t>   </a:t>
               </a:r>
               <a:r>
-                <a:rPr lang="en-US" dirty="0" smtClean="0"/>
+                <a:rPr lang="en-US" sz="1600" dirty="0" smtClean="0"/>
                 <a:t>C</a:t>
               </a:r>
               <a:r>
-                <a:rPr lang="en-US" baseline="-25000" dirty="0" smtClean="0"/>
+                <a:rPr lang="en-US" sz="1600" baseline="-25000" dirty="0" smtClean="0"/>
                 <a:t>r</a:t>
               </a:r>
               <a:r>
-                <a:rPr lang="en-US" dirty="0" smtClean="0"/>
+                <a:rPr lang="en-US" sz="1600" dirty="0" smtClean="0"/>
                 <a:t>’</a:t>
               </a:r>
-              <a:endParaRPr lang="en-US" dirty="0"/>
+              <a:endParaRPr lang="en-US" sz="1600" dirty="0"/>
             </a:p>
           </p:txBody>
         </p:sp>
@@ -6218,7 +6517,7 @@
           </p:nvSpPr>
           <p:spPr>
             <a:xfrm>
-              <a:off x="2425475" y="5445224"/>
+              <a:off x="2463440" y="6564786"/>
               <a:ext cx="1586590" cy="558717"/>
             </a:xfrm>
             <a:prstGeom prst="roundRect">
@@ -6245,17 +6544,29 @@
             <a:p>
               <a:pPr algn="ctr"/>
               <a:r>
-                <a:rPr lang="en-US" dirty="0" smtClean="0"/>
-                <a:t>Image for the </a:t>
-              </a:r>
-            </a:p>
-            <a:p>
-              <a:pPr algn="ctr"/>
-              <a:r>
-                <a:rPr lang="en-US" dirty="0" smtClean="0"/>
-                <a:t>left eye</a:t>
-              </a:r>
-              <a:endParaRPr lang="en-US" dirty="0"/>
+                <a:rPr lang="en-US" dirty="0"/>
+                <a:t>R</a:t>
+              </a:r>
+              <a:r>
+                <a:rPr lang="en-US" baseline="-25000" dirty="0"/>
+                <a:t>2</a:t>
+              </a:r>
+              <a:r>
+                <a:rPr lang="en-US" dirty="0"/>
+                <a:t>G</a:t>
+              </a:r>
+              <a:r>
+                <a:rPr lang="en-US" baseline="-25000" dirty="0"/>
+                <a:t>2</a:t>
+              </a:r>
+              <a:r>
+                <a:rPr lang="en-US" dirty="0"/>
+                <a:t>B</a:t>
+              </a:r>
+              <a:r>
+                <a:rPr lang="en-US" baseline="-25000" dirty="0"/>
+                <a:t>2</a:t>
+              </a:r>
             </a:p>
           </p:txBody>
         </p:sp>
@@ -6294,30 +6605,30 @@
             <a:p>
               <a:pPr algn="ctr"/>
               <a:r>
-                <a:rPr lang="en-US" dirty="0" smtClean="0"/>
-                <a:t>Y   </a:t>
-              </a:r>
-              <a:r>
-                <a:rPr lang="en-US" dirty="0" err="1" smtClean="0"/>
+                <a:rPr lang="en-US" sz="1600" dirty="0" smtClean="0"/>
+                <a:t>Subsampled Y   </a:t>
+              </a:r>
+              <a:r>
+                <a:rPr lang="en-US" sz="1600" dirty="0" err="1" smtClean="0"/>
                 <a:t>C</a:t>
               </a:r>
               <a:r>
-                <a:rPr lang="en-US" baseline="-25000" dirty="0" err="1" smtClean="0"/>
+                <a:rPr lang="en-US" sz="1600" baseline="-25000" dirty="0" err="1" smtClean="0"/>
                 <a:t>b</a:t>
               </a:r>
               <a:r>
-                <a:rPr lang="en-US" baseline="-25000" dirty="0" smtClean="0"/>
+                <a:rPr lang="en-US" sz="1600" baseline="-25000" dirty="0" smtClean="0"/>
                 <a:t>   </a:t>
               </a:r>
               <a:r>
-                <a:rPr lang="en-US" dirty="0" smtClean="0"/>
+                <a:rPr lang="en-US" sz="1600" dirty="0" smtClean="0"/>
                 <a:t>C</a:t>
               </a:r>
               <a:r>
-                <a:rPr lang="en-US" baseline="-25000" dirty="0" smtClean="0"/>
+                <a:rPr lang="en-US" sz="1600" baseline="-25000" dirty="0" smtClean="0"/>
                 <a:t>r</a:t>
               </a:r>
-              <a:endParaRPr lang="en-US" dirty="0"/>
+              <a:endParaRPr lang="en-US" sz="1600" dirty="0"/>
             </a:p>
           </p:txBody>
         </p:sp>
@@ -6329,38 +6640,26 @@
           </p:nvSpPr>
           <p:spPr>
             <a:xfrm>
-              <a:off x="3419872" y="4365104"/>
+              <a:off x="3419872" y="4941168"/>
               <a:ext cx="3024336" cy="360040"/>
             </a:xfrm>
             <a:prstGeom prst="rect">
               <a:avLst/>
             </a:prstGeom>
-            <a:solidFill>
-              <a:schemeClr val="accent1">
-                <a:lumMod val="60000"/>
-                <a:lumOff val="40000"/>
-              </a:schemeClr>
-            </a:solidFill>
-            <a:ln>
-              <a:solidFill>
-                <a:schemeClr val="accent1"/>
-              </a:solidFill>
-            </a:ln>
+            <a:ln/>
           </p:spPr>
           <p:style>
-            <a:lnRef idx="2">
-              <a:schemeClr val="accent5">
-                <a:shade val="50000"/>
-              </a:schemeClr>
+            <a:lnRef idx="1">
+              <a:schemeClr val="accent1"/>
             </a:lnRef>
-            <a:fillRef idx="1">
-              <a:schemeClr val="accent5"/>
+            <a:fillRef idx="2">
+              <a:schemeClr val="accent1"/>
             </a:fillRef>
-            <a:effectRef idx="0">
-              <a:schemeClr val="accent5"/>
+            <a:effectRef idx="1">
+              <a:schemeClr val="accent1"/>
             </a:effectRef>
             <a:fontRef idx="minor">
-              <a:schemeClr val="lt1"/>
+              <a:schemeClr val="dk1"/>
             </a:fontRef>
           </p:style>
           <p:txBody>
@@ -6400,38 +6699,26 @@
           </p:nvSpPr>
           <p:spPr>
             <a:xfrm>
-              <a:off x="3419872" y="3933056"/>
+              <a:off x="3419872" y="3861048"/>
               <a:ext cx="3024336" cy="360040"/>
             </a:xfrm>
             <a:prstGeom prst="rect">
               <a:avLst/>
             </a:prstGeom>
-            <a:solidFill>
-              <a:schemeClr val="accent1">
-                <a:lumMod val="60000"/>
-                <a:lumOff val="40000"/>
-              </a:schemeClr>
-            </a:solidFill>
-            <a:ln>
-              <a:solidFill>
-                <a:schemeClr val="accent1"/>
-              </a:solidFill>
-            </a:ln>
+            <a:ln/>
           </p:spPr>
           <p:style>
-            <a:lnRef idx="2">
-              <a:schemeClr val="accent5">
-                <a:shade val="50000"/>
-              </a:schemeClr>
+            <a:lnRef idx="1">
+              <a:schemeClr val="accent1"/>
             </a:lnRef>
-            <a:fillRef idx="1">
-              <a:schemeClr val="accent5"/>
+            <a:fillRef idx="2">
+              <a:schemeClr val="accent1"/>
             </a:fillRef>
-            <a:effectRef idx="0">
-              <a:schemeClr val="accent5"/>
+            <a:effectRef idx="1">
+              <a:schemeClr val="accent1"/>
             </a:effectRef>
             <a:fontRef idx="minor">
-              <a:schemeClr val="lt1"/>
+              <a:schemeClr val="dk1"/>
             </a:fontRef>
           </p:style>
           <p:txBody>
@@ -6441,49 +6728,12 @@
               <a:pPr algn="ctr"/>
               <a:r>
                 <a:rPr lang="en-US" sz="1400" dirty="0" smtClean="0"/>
-                <a:t>4:4:4 CHROMINANCE </a:t>
-              </a:r>
-              <a:r>
-                <a:rPr lang="en-US" sz="1400" dirty="0" smtClean="0"/>
-                <a:t>SUBSAMPLING</a:t>
+                <a:t>4:4:4 CHROMINANCE REVERSION</a:t>
               </a:r>
               <a:endParaRPr lang="en-US" sz="1400" dirty="0"/>
             </a:p>
           </p:txBody>
         </p:sp>
-        <p:cxnSp>
-          <p:nvCxnSpPr>
-            <p:cNvPr id="18" name="Conector de seta reta 17"/>
-            <p:cNvCxnSpPr/>
-            <p:nvPr/>
-          </p:nvCxnSpPr>
-          <p:spPr>
-            <a:xfrm>
-              <a:off x="6197065" y="2024845"/>
-              <a:ext cx="0" cy="360040"/>
-            </a:xfrm>
-            <a:prstGeom prst="straightConnector1">
-              <a:avLst/>
-            </a:prstGeom>
-            <a:ln w="28575">
-              <a:tailEnd type="arrow"/>
-            </a:ln>
-          </p:spPr>
-          <p:style>
-            <a:lnRef idx="1">
-              <a:schemeClr val="dk1"/>
-            </a:lnRef>
-            <a:fillRef idx="0">
-              <a:schemeClr val="dk1"/>
-            </a:fillRef>
-            <a:effectRef idx="0">
-              <a:schemeClr val="dk1"/>
-            </a:effectRef>
-            <a:fontRef idx="minor">
-              <a:schemeClr val="tx1"/>
-            </a:fontRef>
-          </p:style>
-        </p:cxnSp>
         <p:sp>
           <p:nvSpPr>
             <p:cNvPr id="22" name="Retângulo 21"/>
@@ -6492,38 +6742,26 @@
           </p:nvSpPr>
           <p:spPr>
             <a:xfrm>
-              <a:off x="3419872" y="4797152"/>
+              <a:off x="3470099" y="6021288"/>
               <a:ext cx="3024336" cy="360040"/>
             </a:xfrm>
             <a:prstGeom prst="rect">
               <a:avLst/>
             </a:prstGeom>
-            <a:solidFill>
-              <a:schemeClr val="accent1">
-                <a:lumMod val="60000"/>
-                <a:lumOff val="40000"/>
-              </a:schemeClr>
-            </a:solidFill>
-            <a:ln>
-              <a:solidFill>
-                <a:schemeClr val="accent1"/>
-              </a:solidFill>
-            </a:ln>
+            <a:ln/>
           </p:spPr>
           <p:style>
-            <a:lnRef idx="2">
-              <a:schemeClr val="accent5">
-                <a:shade val="50000"/>
-              </a:schemeClr>
+            <a:lnRef idx="1">
+              <a:schemeClr val="accent1"/>
             </a:lnRef>
-            <a:fillRef idx="1">
-              <a:schemeClr val="accent5"/>
+            <a:fillRef idx="2">
+              <a:schemeClr val="accent1"/>
             </a:fillRef>
-            <a:effectRef idx="0">
-              <a:schemeClr val="accent5"/>
+            <a:effectRef idx="1">
+              <a:schemeClr val="accent1"/>
             </a:effectRef>
             <a:fontRef idx="minor">
-              <a:schemeClr val="lt1"/>
+              <a:schemeClr val="dk1"/>
             </a:fontRef>
           </p:style>
           <p:txBody>
@@ -6680,38 +6918,38 @@
             <a:p>
               <a:pPr algn="ctr"/>
               <a:r>
-                <a:rPr lang="en-US" dirty="0" smtClean="0"/>
-                <a:t>Y  </a:t>
-              </a:r>
-              <a:r>
-                <a:rPr lang="en-US" dirty="0" err="1" smtClean="0"/>
+                <a:rPr lang="en-US" sz="1600" dirty="0" smtClean="0"/>
+                <a:t>Subsampled Y  </a:t>
+              </a:r>
+              <a:r>
+                <a:rPr lang="en-US" sz="1600" dirty="0" err="1" smtClean="0"/>
                 <a:t>C</a:t>
               </a:r>
               <a:r>
-                <a:rPr lang="en-US" baseline="-25000" dirty="0" err="1" smtClean="0"/>
+                <a:rPr lang="en-US" sz="1600" baseline="-25000" dirty="0" err="1" smtClean="0"/>
                 <a:t>b</a:t>
               </a:r>
               <a:r>
-                <a:rPr lang="en-US" dirty="0" smtClean="0"/>
+                <a:rPr lang="en-US" sz="1600" dirty="0" smtClean="0"/>
                 <a:t>’</a:t>
               </a:r>
               <a:r>
-                <a:rPr lang="en-US" baseline="-25000" dirty="0" smtClean="0"/>
+                <a:rPr lang="en-US" sz="1600" baseline="-25000" dirty="0" smtClean="0"/>
                 <a:t>  </a:t>
               </a:r>
               <a:r>
-                <a:rPr lang="en-US" dirty="0" smtClean="0"/>
+                <a:rPr lang="en-US" sz="1600" dirty="0" smtClean="0"/>
                 <a:t>C</a:t>
               </a:r>
               <a:r>
-                <a:rPr lang="en-US" baseline="-25000" dirty="0" smtClean="0"/>
+                <a:rPr lang="en-US" sz="1600" baseline="-25000" dirty="0" smtClean="0"/>
                 <a:t>r</a:t>
               </a:r>
               <a:r>
-                <a:rPr lang="en-US" dirty="0" smtClean="0"/>
+                <a:rPr lang="en-US" sz="1600" dirty="0" smtClean="0"/>
                 <a:t>’</a:t>
               </a:r>
-              <a:endParaRPr lang="en-US" dirty="0"/>
+              <a:endParaRPr lang="en-US" sz="1600" dirty="0"/>
             </a:p>
           </p:txBody>
         </p:sp>
@@ -6774,7 +7012,7 @@
           </p:nvSpPr>
           <p:spPr>
             <a:xfrm>
-              <a:off x="5721714" y="5445224"/>
+              <a:off x="5759679" y="6564786"/>
               <a:ext cx="1586590" cy="558717"/>
             </a:xfrm>
             <a:prstGeom prst="roundRect">
@@ -6802,20 +7040,29 @@
               <a:pPr algn="ctr"/>
               <a:r>
                 <a:rPr lang="en-US" dirty="0" smtClean="0"/>
-                <a:t>Image for the </a:t>
-              </a:r>
-            </a:p>
-            <a:p>
-              <a:pPr algn="ctr"/>
+                <a:t>R</a:t>
+              </a:r>
+              <a:r>
+                <a:rPr lang="en-US" baseline="-25000" dirty="0" smtClean="0"/>
+                <a:t>1</a:t>
+              </a:r>
               <a:r>
                 <a:rPr lang="en-US" dirty="0" smtClean="0"/>
-                <a:t>right </a:t>
+                <a:t>G</a:t>
+              </a:r>
+              <a:r>
+                <a:rPr lang="en-US" baseline="-25000" dirty="0" smtClean="0"/>
+                <a:t>1</a:t>
               </a:r>
               <a:r>
                 <a:rPr lang="en-US" dirty="0" smtClean="0"/>
-                <a:t>eye</a:t>
-              </a:r>
-              <a:endParaRPr lang="en-US" dirty="0"/>
+                <a:t>B</a:t>
+              </a:r>
+              <a:r>
+                <a:rPr lang="en-US" baseline="-25000" dirty="0" smtClean="0"/>
+                <a:t>1</a:t>
+              </a:r>
+              <a:endParaRPr lang="en-US" baseline="-25000" dirty="0"/>
             </a:p>
           </p:txBody>
         </p:sp>
@@ -6846,6 +7093,261 @@
                 <a:t>Green-magenta anaglyph</a:t>
               </a:r>
               <a:endParaRPr lang="en-US" sz="1400" i="1" dirty="0"/>
+            </a:p>
+          </p:txBody>
+        </p:sp>
+        <p:sp>
+          <p:nvSpPr>
+            <p:cNvPr id="31" name="Retângulo de cantos arredondados 30"/>
+            <p:cNvSpPr/>
+            <p:nvPr/>
+          </p:nvSpPr>
+          <p:spPr>
+            <a:xfrm>
+              <a:off x="3760062" y="5427193"/>
+              <a:ext cx="1027962" cy="450023"/>
+            </a:xfrm>
+            <a:prstGeom prst="roundRect">
+              <a:avLst/>
+            </a:prstGeom>
+          </p:spPr>
+          <p:style>
+            <a:lnRef idx="2">
+              <a:schemeClr val="dk1"/>
+            </a:lnRef>
+            <a:fillRef idx="1">
+              <a:schemeClr val="lt1"/>
+            </a:fillRef>
+            <a:effectRef idx="0">
+              <a:schemeClr val="dk1"/>
+            </a:effectRef>
+            <a:fontRef idx="minor">
+              <a:schemeClr val="dk1"/>
+            </a:fontRef>
+          </p:style>
+          <p:txBody>
+            <a:bodyPr rtlCol="0" anchor="ctr"/>
+            <a:lstStyle/>
+            <a:p>
+              <a:pPr algn="ctr"/>
+              <a:r>
+                <a:rPr lang="en-US" sz="1600" dirty="0" smtClean="0"/>
+                <a:t>R</a:t>
+              </a:r>
+              <a:r>
+                <a:rPr lang="en-US" sz="1600" baseline="-25000" dirty="0" smtClean="0"/>
+                <a:t>1</a:t>
+              </a:r>
+              <a:r>
+                <a:rPr lang="en-US" sz="1600" dirty="0" smtClean="0"/>
+                <a:t>G</a:t>
+              </a:r>
+              <a:r>
+                <a:rPr lang="en-US" sz="1600" baseline="-25000" dirty="0" smtClean="0"/>
+                <a:t>2</a:t>
+              </a:r>
+              <a:r>
+                <a:rPr lang="en-US" sz="1600" dirty="0" smtClean="0"/>
+                <a:t>B</a:t>
+              </a:r>
+              <a:r>
+                <a:rPr lang="en-US" sz="1600" baseline="-25000" dirty="0" smtClean="0"/>
+                <a:t>1</a:t>
+              </a:r>
+              <a:endParaRPr lang="en-US" sz="1600" baseline="-25000" dirty="0"/>
+            </a:p>
+          </p:txBody>
+        </p:sp>
+        <p:sp>
+          <p:nvSpPr>
+            <p:cNvPr id="35" name="Retângulo de cantos arredondados 34"/>
+            <p:cNvSpPr/>
+            <p:nvPr/>
+          </p:nvSpPr>
+          <p:spPr>
+            <a:xfrm>
+              <a:off x="5008422" y="5427192"/>
+              <a:ext cx="1027962" cy="450023"/>
+            </a:xfrm>
+            <a:prstGeom prst="roundRect">
+              <a:avLst/>
+            </a:prstGeom>
+          </p:spPr>
+          <p:style>
+            <a:lnRef idx="2">
+              <a:schemeClr val="dk1"/>
+            </a:lnRef>
+            <a:fillRef idx="1">
+              <a:schemeClr val="lt1"/>
+            </a:fillRef>
+            <a:effectRef idx="0">
+              <a:schemeClr val="dk1"/>
+            </a:effectRef>
+            <a:fontRef idx="minor">
+              <a:schemeClr val="dk1"/>
+            </a:fontRef>
+          </p:style>
+          <p:txBody>
+            <a:bodyPr rtlCol="0" anchor="ctr"/>
+            <a:lstStyle/>
+            <a:p>
+              <a:pPr algn="ctr"/>
+              <a:r>
+                <a:rPr lang="en-US" sz="1600" dirty="0"/>
+                <a:t>R</a:t>
+              </a:r>
+              <a:r>
+                <a:rPr lang="en-US" sz="1600" baseline="-25000" dirty="0"/>
+                <a:t>2</a:t>
+              </a:r>
+              <a:r>
+                <a:rPr lang="en-US" sz="1600" dirty="0"/>
+                <a:t>G</a:t>
+              </a:r>
+              <a:r>
+                <a:rPr lang="en-US" sz="1600" baseline="-25000" dirty="0"/>
+                <a:t>1</a:t>
+              </a:r>
+              <a:r>
+                <a:rPr lang="en-US" sz="1600" dirty="0"/>
+                <a:t>B</a:t>
+              </a:r>
+              <a:r>
+                <a:rPr lang="en-US" sz="1600" baseline="-25000" dirty="0"/>
+                <a:t>2</a:t>
+              </a:r>
+            </a:p>
+          </p:txBody>
+        </p:sp>
+        <p:sp>
+          <p:nvSpPr>
+            <p:cNvPr id="36" name="Retângulo de cantos arredondados 35"/>
+            <p:cNvSpPr/>
+            <p:nvPr/>
+          </p:nvSpPr>
+          <p:spPr>
+            <a:xfrm>
+              <a:off x="3760062" y="4347129"/>
+              <a:ext cx="1027962" cy="450023"/>
+            </a:xfrm>
+            <a:prstGeom prst="roundRect">
+              <a:avLst/>
+            </a:prstGeom>
+          </p:spPr>
+          <p:style>
+            <a:lnRef idx="2">
+              <a:schemeClr val="dk1"/>
+            </a:lnRef>
+            <a:fillRef idx="1">
+              <a:schemeClr val="lt1"/>
+            </a:fillRef>
+            <a:effectRef idx="0">
+              <a:schemeClr val="dk1"/>
+            </a:effectRef>
+            <a:fontRef idx="minor">
+              <a:schemeClr val="dk1"/>
+            </a:fontRef>
+          </p:style>
+          <p:txBody>
+            <a:bodyPr rtlCol="0" anchor="ctr"/>
+            <a:lstStyle/>
+            <a:p>
+              <a:pPr algn="ctr"/>
+              <a:r>
+                <a:rPr lang="en-US" sz="1600" dirty="0" smtClean="0"/>
+                <a:t>Y  </a:t>
+              </a:r>
+              <a:r>
+                <a:rPr lang="en-US" sz="1600" dirty="0" err="1" smtClean="0"/>
+                <a:t>C</a:t>
+              </a:r>
+              <a:r>
+                <a:rPr lang="en-US" sz="1600" baseline="-25000" dirty="0" err="1" smtClean="0"/>
+                <a:t>b</a:t>
+              </a:r>
+              <a:r>
+                <a:rPr lang="en-US" sz="1600" dirty="0" smtClean="0"/>
+                <a:t>’</a:t>
+              </a:r>
+              <a:r>
+                <a:rPr lang="en-US" sz="1600" baseline="-25000" dirty="0" smtClean="0"/>
+                <a:t>  </a:t>
+              </a:r>
+              <a:r>
+                <a:rPr lang="en-US" sz="1600" dirty="0" smtClean="0"/>
+                <a:t>C</a:t>
+              </a:r>
+              <a:r>
+                <a:rPr lang="en-US" sz="1600" baseline="-25000" dirty="0" smtClean="0"/>
+                <a:t>r</a:t>
+              </a:r>
+              <a:r>
+                <a:rPr lang="en-US" sz="1600" dirty="0" smtClean="0"/>
+                <a:t>’</a:t>
+              </a:r>
+              <a:endParaRPr lang="en-US" sz="1600" dirty="0"/>
+            </a:p>
+          </p:txBody>
+        </p:sp>
+        <p:sp>
+          <p:nvSpPr>
+            <p:cNvPr id="37" name="Retângulo de cantos arredondados 36"/>
+            <p:cNvSpPr/>
+            <p:nvPr/>
+          </p:nvSpPr>
+          <p:spPr>
+            <a:xfrm>
+              <a:off x="5008422" y="4344352"/>
+              <a:ext cx="1027962" cy="450023"/>
+            </a:xfrm>
+            <a:prstGeom prst="roundRect">
+              <a:avLst/>
+            </a:prstGeom>
+          </p:spPr>
+          <p:style>
+            <a:lnRef idx="2">
+              <a:schemeClr val="dk1"/>
+            </a:lnRef>
+            <a:fillRef idx="1">
+              <a:schemeClr val="lt1"/>
+            </a:fillRef>
+            <a:effectRef idx="0">
+              <a:schemeClr val="dk1"/>
+            </a:effectRef>
+            <a:fontRef idx="minor">
+              <a:schemeClr val="dk1"/>
+            </a:fontRef>
+          </p:style>
+          <p:txBody>
+            <a:bodyPr rtlCol="0" anchor="ctr"/>
+            <a:lstStyle/>
+            <a:p>
+              <a:pPr algn="ctr"/>
+              <a:r>
+                <a:rPr lang="en-US" sz="1600" dirty="0" smtClean="0"/>
+                <a:t>Y  </a:t>
+              </a:r>
+              <a:r>
+                <a:rPr lang="en-US" sz="1600" dirty="0" err="1" smtClean="0"/>
+                <a:t>C</a:t>
+              </a:r>
+              <a:r>
+                <a:rPr lang="en-US" sz="1600" baseline="-25000" dirty="0" err="1" smtClean="0"/>
+                <a:t>b</a:t>
+              </a:r>
+              <a:r>
+                <a:rPr lang="en-US" sz="1600" baseline="-25000" dirty="0" smtClean="0"/>
+                <a:t>  </a:t>
+              </a:r>
+              <a:r>
+                <a:rPr lang="en-US" sz="1600" dirty="0" smtClean="0"/>
+                <a:t>C</a:t>
+              </a:r>
+              <a:r>
+                <a:rPr lang="en-US" sz="1600" baseline="-25000" dirty="0" smtClean="0"/>
+                <a:t>r</a:t>
+              </a:r>
+              <a:endParaRPr lang="en-US" sz="1600" dirty="0"/>
             </a:p>
           </p:txBody>
         </p:sp>
@@ -11489,47 +11991,6 @@
             </a:extLst>
           </p:spPr>
         </p:pic>
-        <p:pic>
-          <p:nvPicPr>
-            <p:cNvPr id="1030" name="Picture 6" descr="C:\Documents and Settings\Matheus\Desktop\Mestrado\1-Meus-Artigos\WebMedia11\old01-anaglyph-reversed-anaglyph.bmp"/>
-            <p:cNvPicPr>
-              <a:picLocks noChangeAspect="1" noChangeArrowheads="1"/>
-            </p:cNvPicPr>
-            <p:nvPr/>
-          </p:nvPicPr>
-          <p:blipFill>
-            <a:blip r:embed="rId2">
-              <a:extLst>
-                <a:ext uri="{28A0092B-C50C-407E-A947-70E740481C1C}">
-                  <a14:useLocalDpi xmlns:a14="http://schemas.microsoft.com/office/drawing/2010/main" val="0"/>
-                </a:ext>
-              </a:extLst>
-            </a:blip>
-            <a:srcRect/>
-            <a:stretch>
-              <a:fillRect/>
-            </a:stretch>
-          </p:blipFill>
-          <p:spPr bwMode="auto">
-            <a:xfrm>
-              <a:off x="1691680" y="3983682"/>
-              <a:ext cx="5924550" cy="3333750"/>
-            </a:xfrm>
-            <a:prstGeom prst="rect">
-              <a:avLst/>
-            </a:prstGeom>
-            <a:noFill/>
-            <a:extLst>
-              <a:ext uri="{909E8E84-426E-40DD-AFC4-6F175D3DCCD1}">
-                <a14:hiddenFill xmlns:a14="http://schemas.microsoft.com/office/drawing/2010/main">
-                  <a:solidFill>
-                    <a:srgbClr val="FFFFFF"/>
-                  </a:solidFill>
-                </a14:hiddenFill>
-              </a:ext>
-            </a:extLst>
-          </p:spPr>
-        </p:pic>
         <p:sp>
           <p:nvSpPr>
             <p:cNvPr id="3" name="CaixaDeTexto 2"/>
@@ -11591,6 +12052,47 @@
           </p:txBody>
         </p:sp>
       </p:grpSp>
+      <p:pic>
+        <p:nvPicPr>
+          <p:cNvPr id="1026" name="Picture 2" descr="C:\Documents and Settings\Matheus\Desktop\Mestrado\4-OpenCV\sideBySide_AboveBelow-to-anaglyph\anaglyph.bmp"/>
+          <p:cNvPicPr>
+            <a:picLocks noChangeAspect="1" noChangeArrowheads="1"/>
+          </p:cNvPicPr>
+          <p:nvPr/>
+        </p:nvPicPr>
+        <p:blipFill>
+          <a:blip r:embed="rId3">
+            <a:extLst>
+              <a:ext uri="{28A0092B-C50C-407E-A947-70E740481C1C}">
+                <a14:useLocalDpi xmlns:a14="http://schemas.microsoft.com/office/drawing/2010/main" val="0"/>
+              </a:ext>
+            </a:extLst>
+          </a:blip>
+          <a:srcRect/>
+          <a:stretch>
+            <a:fillRect/>
+          </a:stretch>
+        </p:blipFill>
+        <p:spPr bwMode="auto">
+          <a:xfrm>
+            <a:off x="1688905" y="5351834"/>
+            <a:ext cx="5926667" cy="3333750"/>
+          </a:xfrm>
+          <a:prstGeom prst="rect">
+            <a:avLst/>
+          </a:prstGeom>
+          <a:noFill/>
+          <a:extLst>
+            <a:ext uri="{909E8E84-426E-40DD-AFC4-6F175D3DCCD1}">
+              <a14:hiddenFill xmlns:a14="http://schemas.microsoft.com/office/drawing/2010/main">
+                <a:solidFill>
+                  <a:srgbClr val="FFFFFF"/>
+                </a:solidFill>
+              </a14:hiddenFill>
+            </a:ext>
+          </a:extLst>
+        </p:spPr>
+      </p:pic>
     </p:spTree>
     <p:extLst>
       <p:ext uri="{BB962C8B-B14F-4D97-AF65-F5344CB8AC3E}">

</xml_diff>

<commit_message>
ACM SAC - artigo finalizado para submissão. Será enviado ao professor para revisão final. - remoção de arquivos com dados antigos - alteração na imagem do processo de conversão anaglífica - criação do código que realiza compressão lossless utilizando a biblioteca easyzlib
</commit_message>
<xml_diff>
--- a/Imagens/imagens-para-artigos-dissertacao.pptx
+++ b/Imagens/imagens-para-artigos-dissertacao.pptx
@@ -301,7 +301,7 @@
           <a:p>
             <a:fld id="{E14A8D8A-9BF6-4F09-B8D2-3E331CA72F09}" type="datetimeFigureOut">
               <a:rPr lang="pt-BR" smtClean="0"/>
-              <a:t>6/9/2011</a:t>
+              <a:t>07/09/2011</a:t>
             </a:fld>
             <a:endParaRPr lang="pt-BR"/>
           </a:p>
@@ -471,7 +471,7 @@
           <a:p>
             <a:fld id="{E14A8D8A-9BF6-4F09-B8D2-3E331CA72F09}" type="datetimeFigureOut">
               <a:rPr lang="pt-BR" smtClean="0"/>
-              <a:t>6/9/2011</a:t>
+              <a:t>07/09/2011</a:t>
             </a:fld>
             <a:endParaRPr lang="pt-BR"/>
           </a:p>
@@ -651,7 +651,7 @@
           <a:p>
             <a:fld id="{E14A8D8A-9BF6-4F09-B8D2-3E331CA72F09}" type="datetimeFigureOut">
               <a:rPr lang="pt-BR" smtClean="0"/>
-              <a:t>6/9/2011</a:t>
+              <a:t>07/09/2011</a:t>
             </a:fld>
             <a:endParaRPr lang="pt-BR"/>
           </a:p>
@@ -821,7 +821,7 @@
           <a:p>
             <a:fld id="{E14A8D8A-9BF6-4F09-B8D2-3E331CA72F09}" type="datetimeFigureOut">
               <a:rPr lang="pt-BR" smtClean="0"/>
-              <a:t>6/9/2011</a:t>
+              <a:t>07/09/2011</a:t>
             </a:fld>
             <a:endParaRPr lang="pt-BR"/>
           </a:p>
@@ -1067,7 +1067,7 @@
           <a:p>
             <a:fld id="{E14A8D8A-9BF6-4F09-B8D2-3E331CA72F09}" type="datetimeFigureOut">
               <a:rPr lang="pt-BR" smtClean="0"/>
-              <a:t>6/9/2011</a:t>
+              <a:t>07/09/2011</a:t>
             </a:fld>
             <a:endParaRPr lang="pt-BR"/>
           </a:p>
@@ -1355,7 +1355,7 @@
           <a:p>
             <a:fld id="{E14A8D8A-9BF6-4F09-B8D2-3E331CA72F09}" type="datetimeFigureOut">
               <a:rPr lang="pt-BR" smtClean="0"/>
-              <a:t>6/9/2011</a:t>
+              <a:t>07/09/2011</a:t>
             </a:fld>
             <a:endParaRPr lang="pt-BR"/>
           </a:p>
@@ -1777,7 +1777,7 @@
           <a:p>
             <a:fld id="{E14A8D8A-9BF6-4F09-B8D2-3E331CA72F09}" type="datetimeFigureOut">
               <a:rPr lang="pt-BR" smtClean="0"/>
-              <a:t>6/9/2011</a:t>
+              <a:t>07/09/2011</a:t>
             </a:fld>
             <a:endParaRPr lang="pt-BR"/>
           </a:p>
@@ -1895,7 +1895,7 @@
           <a:p>
             <a:fld id="{E14A8D8A-9BF6-4F09-B8D2-3E331CA72F09}" type="datetimeFigureOut">
               <a:rPr lang="pt-BR" smtClean="0"/>
-              <a:t>6/9/2011</a:t>
+              <a:t>07/09/2011</a:t>
             </a:fld>
             <a:endParaRPr lang="pt-BR"/>
           </a:p>
@@ -1990,7 +1990,7 @@
           <a:p>
             <a:fld id="{E14A8D8A-9BF6-4F09-B8D2-3E331CA72F09}" type="datetimeFigureOut">
               <a:rPr lang="pt-BR" smtClean="0"/>
-              <a:t>6/9/2011</a:t>
+              <a:t>07/09/2011</a:t>
             </a:fld>
             <a:endParaRPr lang="pt-BR"/>
           </a:p>
@@ -2267,7 +2267,7 @@
           <a:p>
             <a:fld id="{E14A8D8A-9BF6-4F09-B8D2-3E331CA72F09}" type="datetimeFigureOut">
               <a:rPr lang="pt-BR" smtClean="0"/>
-              <a:t>6/9/2011</a:t>
+              <a:t>07/09/2011</a:t>
             </a:fld>
             <a:endParaRPr lang="pt-BR"/>
           </a:p>
@@ -2520,7 +2520,7 @@
           <a:p>
             <a:fld id="{E14A8D8A-9BF6-4F09-B8D2-3E331CA72F09}" type="datetimeFigureOut">
               <a:rPr lang="pt-BR" smtClean="0"/>
-              <a:t>6/9/2011</a:t>
+              <a:t>07/09/2011</a:t>
             </a:fld>
             <a:endParaRPr lang="pt-BR"/>
           </a:p>
@@ -2733,7 +2733,7 @@
           <a:p>
             <a:fld id="{E14A8D8A-9BF6-4F09-B8D2-3E331CA72F09}" type="datetimeFigureOut">
               <a:rPr lang="pt-BR" smtClean="0"/>
-              <a:t>6/9/2011</a:t>
+              <a:t>07/09/2011</a:t>
             </a:fld>
             <a:endParaRPr lang="pt-BR"/>
           </a:p>
@@ -5259,29 +5259,30 @@
             <a:p>
               <a:pPr algn="ctr"/>
               <a:r>
-                <a:rPr lang="en-US" dirty="0"/>
+                <a:rPr lang="en-US" dirty="0" smtClean="0"/>
                 <a:t>R</a:t>
               </a:r>
               <a:r>
-                <a:rPr lang="en-US" baseline="-25000" dirty="0"/>
-                <a:t>2</a:t>
-              </a:r>
-              <a:r>
-                <a:rPr lang="en-US" dirty="0"/>
+                <a:rPr lang="en-US" baseline="-25000" dirty="0" smtClean="0"/>
+                <a:t>1</a:t>
+              </a:r>
+              <a:r>
+                <a:rPr lang="en-US" dirty="0" smtClean="0"/>
                 <a:t>G</a:t>
               </a:r>
               <a:r>
-                <a:rPr lang="en-US" baseline="-25000" dirty="0"/>
-                <a:t>2</a:t>
-              </a:r>
-              <a:r>
-                <a:rPr lang="en-US" dirty="0"/>
+                <a:rPr lang="en-US" baseline="-25000" dirty="0" smtClean="0"/>
+                <a:t>1</a:t>
+              </a:r>
+              <a:r>
+                <a:rPr lang="en-US" dirty="0" smtClean="0"/>
                 <a:t>B</a:t>
               </a:r>
               <a:r>
-                <a:rPr lang="en-US" baseline="-25000" dirty="0"/>
-                <a:t>2</a:t>
-              </a:r>
+                <a:rPr lang="en-US" baseline="-25000" dirty="0" smtClean="0"/>
+                <a:t>1</a:t>
+              </a:r>
+              <a:endParaRPr lang="en-US" baseline="-25000" dirty="0"/>
             </a:p>
           </p:txBody>
         </p:sp>

</xml_diff>